<commit_message>
bugs fix and ppt
</commit_message>
<xml_diff>
--- a/SCRABBLE.pptx
+++ b/SCRABBLE.pptx
@@ -40,8 +40,25 @@
     <p:sldId id="289" r:id="rId34"/>
     <p:sldId id="290" r:id="rId35"/>
     <p:sldId id="291" r:id="rId36"/>
-    <p:sldId id="293" r:id="rId37"/>
-    <p:sldId id="292" r:id="rId38"/>
+    <p:sldId id="295" r:id="rId37"/>
+    <p:sldId id="294" r:id="rId38"/>
+    <p:sldId id="296" r:id="rId39"/>
+    <p:sldId id="297" r:id="rId40"/>
+    <p:sldId id="298" r:id="rId41"/>
+    <p:sldId id="299" r:id="rId42"/>
+    <p:sldId id="300" r:id="rId43"/>
+    <p:sldId id="301" r:id="rId44"/>
+    <p:sldId id="302" r:id="rId45"/>
+    <p:sldId id="303" r:id="rId46"/>
+    <p:sldId id="304" r:id="rId47"/>
+    <p:sldId id="305" r:id="rId48"/>
+    <p:sldId id="293" r:id="rId49"/>
+    <p:sldId id="306" r:id="rId50"/>
+    <p:sldId id="307" r:id="rId51"/>
+    <p:sldId id="308" r:id="rId52"/>
+    <p:sldId id="309" r:id="rId53"/>
+    <p:sldId id="310" r:id="rId54"/>
+    <p:sldId id="292" r:id="rId55"/>
   </p:sldIdLst>
   <p:sldSz cx="12192000" cy="6858000"/>
   <p:notesSz cx="6858000" cy="9144000"/>
@@ -484,7 +501,7 @@
             <a:fld id="{5923F103-BC34-4FE4-A40E-EDDEECFDA5D0}" type="datetimeFigureOut">
               <a:rPr lang="en-US" dirty="0"/>
               <a:pPr/>
-              <a:t>8/3/2025</a:t>
+              <a:t>8/6/2025</a:t>
             </a:fld>
             <a:endParaRPr lang="en-US" dirty="0"/>
           </a:p>
@@ -1568,7 +1585,7 @@
           <a:p>
             <a:fld id="{923A1CC3-2375-41D4-9E03-427CAF2A4C1A}" type="datetimeFigureOut">
               <a:rPr lang="en-US" dirty="0"/>
-              <a:t>8/3/2025</a:t>
+              <a:t>8/6/2025</a:t>
             </a:fld>
             <a:endParaRPr lang="en-US" dirty="0"/>
           </a:p>
@@ -2544,7 +2561,7 @@
           <a:p>
             <a:fld id="{AFF16868-8199-4C2C-A5B1-63AEE139F88E}" type="datetimeFigureOut">
               <a:rPr lang="en-US" dirty="0"/>
-              <a:t>8/3/2025</a:t>
+              <a:t>8/6/2025</a:t>
             </a:fld>
             <a:endParaRPr lang="en-US" dirty="0"/>
           </a:p>
@@ -3674,7 +3691,7 @@
           <a:p>
             <a:fld id="{AAD9FF7F-6988-44CC-821B-644E70CD2F73}" type="datetimeFigureOut">
               <a:rPr lang="en-US" dirty="0"/>
-              <a:t>8/3/2025</a:t>
+              <a:t>8/6/2025</a:t>
             </a:fld>
             <a:endParaRPr lang="en-US" dirty="0"/>
           </a:p>
@@ -4703,7 +4720,7 @@
           <a:p>
             <a:fld id="{5C12C299-16B2-4475-990D-751901EACC14}" type="datetimeFigureOut">
               <a:rPr lang="en-US" dirty="0"/>
-              <a:t>8/3/2025</a:t>
+              <a:t>8/6/2025</a:t>
             </a:fld>
             <a:endParaRPr lang="en-US" dirty="0"/>
           </a:p>
@@ -5359,7 +5376,7 @@
           <a:p>
             <a:fld id="{9FE86839-B9D8-4651-8783-F325ECE74E65}" type="datetimeFigureOut">
               <a:rPr lang="en-US" dirty="0"/>
-              <a:t>8/3/2025</a:t>
+              <a:t>8/6/2025</a:t>
             </a:fld>
             <a:endParaRPr lang="en-US" dirty="0"/>
           </a:p>
@@ -6216,7 +6233,7 @@
           <a:p>
             <a:fld id="{FD484F64-32F6-45C5-931F-ADC1662401D0}" type="datetimeFigureOut">
               <a:rPr lang="en-US" dirty="0"/>
-              <a:t>8/3/2025</a:t>
+              <a:t>8/6/2025</a:t>
             </a:fld>
             <a:endParaRPr lang="en-US" dirty="0"/>
           </a:p>
@@ -6402,7 +6419,7 @@
           <a:p>
             <a:fld id="{53086D93-FCAC-47E0-A2EE-787E62CA814C}" type="datetimeFigureOut">
               <a:rPr lang="en-US" dirty="0"/>
-              <a:t>8/3/2025</a:t>
+              <a:t>8/6/2025</a:t>
             </a:fld>
             <a:endParaRPr lang="en-US" dirty="0"/>
           </a:p>
@@ -7370,7 +7387,7 @@
           <a:p>
             <a:fld id="{CDA879A6-0FD0-4734-A311-86BFCA472E6E}" type="datetimeFigureOut">
               <a:rPr lang="en-US" dirty="0"/>
-              <a:t>8/3/2025</a:t>
+              <a:t>8/6/2025</a:t>
             </a:fld>
             <a:endParaRPr lang="en-US" dirty="0"/>
           </a:p>
@@ -7577,7 +7594,7 @@
           <a:p>
             <a:fld id="{19C9CA7B-DFD4-44B5-8C60-D14B8CD1FB59}" type="datetimeFigureOut">
               <a:rPr lang="en-US" dirty="0"/>
-              <a:t>8/3/2025</a:t>
+              <a:t>8/6/2025</a:t>
             </a:fld>
             <a:endParaRPr lang="en-US" dirty="0"/>
           </a:p>
@@ -8607,7 +8624,7 @@
           <a:p>
             <a:fld id="{F34E6425-0181-43F2-84FC-787E803FD2F8}" type="datetimeFigureOut">
               <a:rPr lang="en-US" dirty="0"/>
-              <a:t>8/3/2025</a:t>
+              <a:t>8/6/2025</a:t>
             </a:fld>
             <a:endParaRPr lang="en-US" dirty="0"/>
           </a:p>
@@ -8875,7 +8892,7 @@
           <a:p>
             <a:fld id="{3BDB8791-F1B0-41E7-B7FD-A781E65C4266}" type="datetimeFigureOut">
               <a:rPr lang="en-US" dirty="0"/>
-              <a:t>8/3/2025</a:t>
+              <a:t>8/6/2025</a:t>
             </a:fld>
             <a:endParaRPr lang="en-US" dirty="0"/>
           </a:p>
@@ -9281,7 +9298,7 @@
           <a:p>
             <a:fld id="{5FDD63B2-E120-4ED8-B27B-C685F510A5FE}" type="datetimeFigureOut">
               <a:rPr lang="en-US" dirty="0"/>
-              <a:t>8/3/2025</a:t>
+              <a:t>8/6/2025</a:t>
             </a:fld>
             <a:endParaRPr lang="en-US" dirty="0"/>
           </a:p>
@@ -9404,7 +9421,7 @@
           <a:p>
             <a:fld id="{7AA18ACC-A947-437B-A130-35BD54FDF1E9}" type="datetimeFigureOut">
               <a:rPr lang="en-US" dirty="0"/>
-              <a:t>8/3/2025</a:t>
+              <a:t>8/6/2025</a:t>
             </a:fld>
             <a:endParaRPr lang="en-US" dirty="0"/>
           </a:p>
@@ -9495,7 +9512,7 @@
           <a:p>
             <a:fld id="{7C8D7E02-BCB8-4D50-A234-369438C08659}" type="datetimeFigureOut">
               <a:rPr lang="en-US" dirty="0"/>
-              <a:t>8/3/2025</a:t>
+              <a:t>8/6/2025</a:t>
             </a:fld>
             <a:endParaRPr lang="en-US" dirty="0"/>
           </a:p>
@@ -10572,7 +10589,7 @@
           <a:p>
             <a:fld id="{76E86A4C-8E40-4F87-A4F0-01A0687C5742}" type="datetimeFigureOut">
               <a:rPr lang="en-US" dirty="0"/>
-              <a:t>8/3/2025</a:t>
+              <a:t>8/6/2025</a:t>
             </a:fld>
             <a:endParaRPr lang="en-US" dirty="0"/>
           </a:p>
@@ -11676,7 +11693,7 @@
           <a:p>
             <a:fld id="{35E72C73-2D91-4E12-BA25-F0AA0C03599B}" type="datetimeFigureOut">
               <a:rPr lang="en-US" dirty="0"/>
-              <a:t>8/3/2025</a:t>
+              <a:t>8/6/2025</a:t>
             </a:fld>
             <a:endParaRPr lang="en-US" dirty="0"/>
           </a:p>
@@ -12669,7 +12686,7 @@
           <a:p>
             <a:fld id="{2BE451C3-0FF4-47C4-B829-773ADF60F88C}" type="datetimeFigureOut">
               <a:rPr lang="en-US" dirty="0"/>
-              <a:t>8/3/2025</a:t>
+              <a:t>8/6/2025</a:t>
             </a:fld>
             <a:endParaRPr lang="en-US" dirty="0"/>
           </a:p>
@@ -17606,7 +17623,7 @@
         <p:cNvPr id="1" name="">
           <a:extLst>
             <a:ext uri="{FF2B5EF4-FFF2-40B4-BE49-F238E27FC236}">
-              <a16:creationId xmlns:a16="http://schemas.microsoft.com/office/drawing/2014/main" id="{F2918E7E-FF9C-5341-B828-E9356FD8AB16}"/>
+              <a16:creationId xmlns:a16="http://schemas.microsoft.com/office/drawing/2014/main" id="{3F52A2BF-EDE7-CD37-E0AD-E8770A48F755}"/>
             </a:ext>
           </a:extLst>
         </p:cNvPr>
@@ -17626,7 +17643,7 @@
           <p:cNvPr id="2" name="Title 1">
             <a:extLst>
               <a:ext uri="{FF2B5EF4-FFF2-40B4-BE49-F238E27FC236}">
-                <a16:creationId xmlns:a16="http://schemas.microsoft.com/office/drawing/2014/main" id="{E62F630E-8BB0-6643-2170-DC52A8C3F4D5}"/>
+                <a16:creationId xmlns:a16="http://schemas.microsoft.com/office/drawing/2014/main" id="{3A7852A2-5E72-4D6E-3D72-AA157EFF62C1}"/>
               </a:ext>
             </a:extLst>
           </p:cNvPr>
@@ -17634,7 +17651,7 @@
             <a:spLocks noGrp="1"/>
           </p:cNvSpPr>
           <p:nvPr>
-            <p:ph type="title"/>
+            <p:ph type="ctrTitle"/>
           </p:nvPr>
         </p:nvSpPr>
         <p:spPr/>
@@ -17644,132 +17661,7 @@
           <a:p>
             <a:r>
               <a:rPr lang="es-AR" dirty="0"/>
-              <a:t>RESUMEN DE FUNCIONALIDADES</a:t>
-            </a:r>
-          </a:p>
-        </p:txBody>
-      </p:sp>
-      <p:sp>
-        <p:nvSpPr>
-          <p:cNvPr id="3" name="Content Placeholder 2">
-            <a:extLst>
-              <a:ext uri="{FF2B5EF4-FFF2-40B4-BE49-F238E27FC236}">
-                <a16:creationId xmlns:a16="http://schemas.microsoft.com/office/drawing/2014/main" id="{3409F371-9236-945A-39D5-667DD5C043F0}"/>
-              </a:ext>
-            </a:extLst>
-          </p:cNvPr>
-          <p:cNvSpPr>
-            <a:spLocks noGrp="1"/>
-          </p:cNvSpPr>
-          <p:nvPr>
-            <p:ph idx="1"/>
-          </p:nvPr>
-        </p:nvSpPr>
-        <p:spPr>
-          <a:xfrm>
-            <a:off x="1122830" y="2468031"/>
-            <a:ext cx="8825659" cy="3895061"/>
-          </a:xfrm>
-        </p:spPr>
-        <p:txBody>
-          <a:bodyPr>
-            <a:normAutofit lnSpcReduction="10000"/>
-          </a:bodyPr>
-          <a:lstStyle/>
-          <a:p>
-            <a:pPr marL="0" indent="0">
-              <a:buNone/>
-            </a:pPr>
-            <a:r>
-              <a:rPr lang="es-MX" sz="1600" b="1" dirty="0"/>
-              <a:t>LÓGICA DE NEGOCIO</a:t>
-            </a:r>
-          </a:p>
-          <a:p>
-            <a:pPr marL="0" indent="0">
-              <a:buNone/>
-            </a:pPr>
-            <a:r>
-              <a:rPr lang="es-MX" sz="1600" dirty="0"/>
-              <a:t>• Sistema de turnos con validaciones de estado</a:t>
-            </a:r>
-          </a:p>
-          <a:p>
-            <a:pPr marL="0" indent="0">
-              <a:buNone/>
-            </a:pPr>
-            <a:r>
-              <a:rPr lang="es-MX" sz="1600" dirty="0"/>
-              <a:t>• Cálculo de puntajes con premios especiales del tablero</a:t>
-            </a:r>
-          </a:p>
-          <a:p>
-            <a:pPr marL="0" indent="0">
-              <a:buNone/>
-            </a:pPr>
-            <a:r>
-              <a:rPr lang="es-MX" sz="1600" dirty="0"/>
-              <a:t>• Gestión de fichas con distribución automática y cambio de fichas</a:t>
-            </a:r>
-          </a:p>
-          <a:p>
-            <a:pPr marL="0" indent="0">
-              <a:buNone/>
-            </a:pPr>
-            <a:r>
-              <a:rPr lang="es-MX" sz="1600" dirty="0"/>
-              <a:t>• Ranking persistente con serialización de datos</a:t>
-            </a:r>
-          </a:p>
-          <a:p>
-            <a:pPr marL="0" indent="0">
-              <a:buNone/>
-            </a:pPr>
-            <a:endParaRPr lang="es-MX" sz="1600" b="1" dirty="0"/>
-          </a:p>
-          <a:p>
-            <a:pPr marL="0" indent="0">
-              <a:buNone/>
-            </a:pPr>
-            <a:r>
-              <a:rPr lang="es-MX" sz="1600" b="1" dirty="0"/>
-              <a:t>PATRONES DE DISEÑO</a:t>
-            </a:r>
-          </a:p>
-          <a:p>
-            <a:pPr marL="0" indent="0">
-              <a:buNone/>
-            </a:pPr>
-            <a:r>
-              <a:rPr lang="es-MX" sz="1600" dirty="0"/>
-              <a:t>• MVC estricto con separación de capas</a:t>
-            </a:r>
-          </a:p>
-          <a:p>
-            <a:pPr marL="0" indent="0">
-              <a:buNone/>
-            </a:pPr>
-            <a:r>
-              <a:rPr lang="es-MX" sz="1600" dirty="0"/>
-              <a:t>• Observer/Observable para notificaciones</a:t>
-            </a:r>
-          </a:p>
-          <a:p>
-            <a:pPr marL="0" indent="0">
-              <a:buNone/>
-            </a:pPr>
-            <a:r>
-              <a:rPr lang="es-MX" sz="1600" dirty="0"/>
-              <a:t>• Factory Method para creación de casilleros</a:t>
-            </a:r>
-          </a:p>
-          <a:p>
-            <a:pPr marL="0" indent="0">
-              <a:buNone/>
-            </a:pPr>
-            <a:r>
-              <a:rPr lang="es-MX" sz="1600" dirty="0"/>
-              <a:t>• Strategy implícito en tipos de premio</a:t>
+              <a:t>FUNCIONALIDADES EN EL PROYECTO</a:t>
             </a:r>
           </a:p>
         </p:txBody>
@@ -17777,7 +17669,7 @@
     </p:spTree>
     <p:extLst>
       <p:ext uri="{BB962C8B-B14F-4D97-AF65-F5344CB8AC3E}">
-        <p14:creationId xmlns:p14="http://schemas.microsoft.com/office/powerpoint/2010/main" val="2903332826"/>
+        <p14:creationId xmlns:p14="http://schemas.microsoft.com/office/powerpoint/2010/main" val="3423884082"/>
       </p:ext>
     </p:extLst>
   </p:cSld>
@@ -17795,7 +17687,7 @@
         <p:cNvPr id="1" name="">
           <a:extLst>
             <a:ext uri="{FF2B5EF4-FFF2-40B4-BE49-F238E27FC236}">
-              <a16:creationId xmlns:a16="http://schemas.microsoft.com/office/drawing/2014/main" id="{5E7623B3-12FD-030C-ABA7-9D1DDA7239BE}"/>
+              <a16:creationId xmlns:a16="http://schemas.microsoft.com/office/drawing/2014/main" id="{0C73D070-3138-7F15-F209-33D7458116CF}"/>
             </a:ext>
           </a:extLst>
         </p:cNvPr>
@@ -17815,7 +17707,7 @@
           <p:cNvPr id="2" name="Title 1">
             <a:extLst>
               <a:ext uri="{FF2B5EF4-FFF2-40B4-BE49-F238E27FC236}">
-                <a16:creationId xmlns:a16="http://schemas.microsoft.com/office/drawing/2014/main" id="{7266B12B-56A4-A1C5-11AC-9CA259ED0753}"/>
+                <a16:creationId xmlns:a16="http://schemas.microsoft.com/office/drawing/2014/main" id="{613F9B51-560F-E4A1-4937-B45B440F8545}"/>
               </a:ext>
             </a:extLst>
           </p:cNvPr>
@@ -17823,7 +17715,7 @@
             <a:spLocks noGrp="1"/>
           </p:cNvSpPr>
           <p:nvPr>
-            <p:ph type="ctrTitle"/>
+            <p:ph type="title"/>
           </p:nvPr>
         </p:nvSpPr>
         <p:spPr/>
@@ -17833,7 +17725,98 @@
           <a:p>
             <a:r>
               <a:rPr lang="es-AR" dirty="0"/>
-              <a:t>FIN DE LA PRESENTACIÓN</a:t>
+              <a:t>FUNCIONALIDADES: TURNOS</a:t>
+            </a:r>
+          </a:p>
+        </p:txBody>
+      </p:sp>
+      <p:sp>
+        <p:nvSpPr>
+          <p:cNvPr id="3" name="Content Placeholder 2">
+            <a:extLst>
+              <a:ext uri="{FF2B5EF4-FFF2-40B4-BE49-F238E27FC236}">
+                <a16:creationId xmlns:a16="http://schemas.microsoft.com/office/drawing/2014/main" id="{9D00DF2F-16ED-5AED-8369-9833ADBFF337}"/>
+              </a:ext>
+            </a:extLst>
+          </p:cNvPr>
+          <p:cNvSpPr>
+            <a:spLocks noGrp="1"/>
+          </p:cNvSpPr>
+          <p:nvPr>
+            <p:ph idx="1"/>
+          </p:nvPr>
+        </p:nvSpPr>
+        <p:spPr>
+          <a:xfrm>
+            <a:off x="1122830" y="2468031"/>
+            <a:ext cx="8825659" cy="3895061"/>
+          </a:xfrm>
+        </p:spPr>
+        <p:txBody>
+          <a:bodyPr>
+            <a:normAutofit/>
+          </a:bodyPr>
+          <a:lstStyle/>
+          <a:p>
+            <a:pPr marL="0" indent="0">
+              <a:buNone/>
+            </a:pPr>
+            <a:r>
+              <a:rPr lang="es-MX" sz="1600" b="1" dirty="0"/>
+              <a:t>SISTEMA DE TURNOS</a:t>
+            </a:r>
+          </a:p>
+          <a:p>
+            <a:pPr marL="0" indent="0">
+              <a:buNone/>
+            </a:pPr>
+            <a:r>
+              <a:rPr lang="es-MX" sz="1600" dirty="0"/>
+              <a:t>• IMPLEMENTACIÓN: Clase ModeloJuego maneja turnoActual (índice circular)</a:t>
+            </a:r>
+          </a:p>
+          <a:p>
+            <a:pPr marL="0" indent="0">
+              <a:buNone/>
+            </a:pPr>
+            <a:r>
+              <a:rPr lang="es-MX" sz="1600" dirty="0"/>
+              <a:t>• CARACTERÍSTICA: Sistema sincronizado con múltiples clientes remotos</a:t>
+            </a:r>
+          </a:p>
+          <a:p>
+            <a:pPr marL="0" indent="0">
+              <a:buNone/>
+            </a:pPr>
+            <a:r>
+              <a:rPr lang="es-MX" sz="1600" dirty="0"/>
+              <a:t>• DIFERENCIA DE OTROS JUEGOS: Los turnos se mantienen sincronizados en tiempo real entre todos los clientes conectados </a:t>
+            </a:r>
+            <a:r>
+              <a:rPr lang="es-MX" sz="1600" dirty="0" err="1"/>
+              <a:t>via</a:t>
+            </a:r>
+            <a:r>
+              <a:rPr lang="es-MX" sz="1600" dirty="0"/>
+              <a:t> RMI</a:t>
+            </a:r>
+          </a:p>
+          <a:p>
+            <a:pPr marL="0" indent="0">
+              <a:buNone/>
+            </a:pPr>
+            <a:r>
+              <a:rPr lang="es-MX" sz="1600" dirty="0"/>
+              <a:t>• MÉTODO: siguienteTurno() - incrementa el índice y vuelve a 0 cuando llega al final</a:t>
+            </a:r>
+          </a:p>
+          <a:p>
+            <a:pPr marL="0" indent="0">
+              <a:buNone/>
+            </a:pPr>
+            <a:r>
+              <a:rPr lang="es-MX" sz="1600" dirty="0"/>
+              <a:t>• CONTROL: Cada cliente sabe cuándo es su turno pero solo puede actuar cuando le corresponde</a:t>
             </a:r>
           </a:p>
         </p:txBody>
@@ -17841,7 +17824,328 @@
     </p:spTree>
     <p:extLst>
       <p:ext uri="{BB962C8B-B14F-4D97-AF65-F5344CB8AC3E}">
-        <p14:creationId xmlns:p14="http://schemas.microsoft.com/office/powerpoint/2010/main" val="680458102"/>
+        <p14:creationId xmlns:p14="http://schemas.microsoft.com/office/powerpoint/2010/main" val="2609733913"/>
+      </p:ext>
+    </p:extLst>
+  </p:cSld>
+  <p:clrMapOvr>
+    <a:masterClrMapping/>
+  </p:clrMapOvr>
+</p:sld>
+</file>
+
+<file path=ppt/slides/slide38.xml><?xml version="1.0" encoding="utf-8"?>
+<p:sld xmlns:a="http://schemas.openxmlformats.org/drawingml/2006/main" xmlns:r="http://schemas.openxmlformats.org/officeDocument/2006/relationships" xmlns:p="http://schemas.openxmlformats.org/presentationml/2006/main">
+  <p:cSld>
+    <p:spTree>
+      <p:nvGrpSpPr>
+        <p:cNvPr id="1" name="">
+          <a:extLst>
+            <a:ext uri="{FF2B5EF4-FFF2-40B4-BE49-F238E27FC236}">
+              <a16:creationId xmlns:a16="http://schemas.microsoft.com/office/drawing/2014/main" id="{273EC1D5-D6C8-B5A5-09D0-0F949F938C4A}"/>
+            </a:ext>
+          </a:extLst>
+        </p:cNvPr>
+        <p:cNvGrpSpPr/>
+        <p:nvPr/>
+      </p:nvGrpSpPr>
+      <p:grpSpPr>
+        <a:xfrm>
+          <a:off x="0" y="0"/>
+          <a:ext cx="0" cy="0"/>
+          <a:chOff x="0" y="0"/>
+          <a:chExt cx="0" cy="0"/>
+        </a:xfrm>
+      </p:grpSpPr>
+      <p:sp>
+        <p:nvSpPr>
+          <p:cNvPr id="2" name="Title 1">
+            <a:extLst>
+              <a:ext uri="{FF2B5EF4-FFF2-40B4-BE49-F238E27FC236}">
+                <a16:creationId xmlns:a16="http://schemas.microsoft.com/office/drawing/2014/main" id="{D0DBBB3C-7CEC-1431-3F42-E96656676E01}"/>
+              </a:ext>
+            </a:extLst>
+          </p:cNvPr>
+          <p:cNvSpPr>
+            <a:spLocks noGrp="1"/>
+          </p:cNvSpPr>
+          <p:nvPr>
+            <p:ph type="title"/>
+          </p:nvPr>
+        </p:nvSpPr>
+        <p:spPr/>
+        <p:txBody>
+          <a:bodyPr/>
+          <a:lstStyle/>
+          <a:p>
+            <a:r>
+              <a:rPr lang="es-AR" dirty="0"/>
+              <a:t>FUNCIONALIDADES: TABLERO</a:t>
+            </a:r>
+          </a:p>
+        </p:txBody>
+      </p:sp>
+      <p:sp>
+        <p:nvSpPr>
+          <p:cNvPr id="3" name="Content Placeholder 2">
+            <a:extLst>
+              <a:ext uri="{FF2B5EF4-FFF2-40B4-BE49-F238E27FC236}">
+                <a16:creationId xmlns:a16="http://schemas.microsoft.com/office/drawing/2014/main" id="{AB17AA1D-5EC6-64FC-1B6F-A03AABE161C0}"/>
+              </a:ext>
+            </a:extLst>
+          </p:cNvPr>
+          <p:cNvSpPr>
+            <a:spLocks noGrp="1"/>
+          </p:cNvSpPr>
+          <p:nvPr>
+            <p:ph idx="1"/>
+          </p:nvPr>
+        </p:nvSpPr>
+        <p:spPr>
+          <a:xfrm>
+            <a:off x="1122830" y="2468031"/>
+            <a:ext cx="8825659" cy="3895061"/>
+          </a:xfrm>
+        </p:spPr>
+        <p:txBody>
+          <a:bodyPr>
+            <a:normAutofit/>
+          </a:bodyPr>
+          <a:lstStyle/>
+          <a:p>
+            <a:pPr marL="0" indent="0">
+              <a:buNone/>
+            </a:pPr>
+            <a:r>
+              <a:rPr lang="es-MX" sz="1600" b="1" dirty="0"/>
+              <a:t>TABLERO BIDIMENSIONAL CON SISTEMA DE PREMIOS</a:t>
+            </a:r>
+          </a:p>
+          <a:p>
+            <a:pPr marL="0" indent="0">
+              <a:buNone/>
+            </a:pPr>
+            <a:r>
+              <a:rPr lang="es-MX" sz="1600" dirty="0"/>
+              <a:t>• ESTRUCTURA: Matriz 16x16 de objetos Casillero (usando patrón Strategy para casilleros especiales)</a:t>
+            </a:r>
+          </a:p>
+          <a:p>
+            <a:pPr marL="0" indent="0">
+              <a:buNone/>
+            </a:pPr>
+            <a:r>
+              <a:rPr lang="es-MX" sz="1600" dirty="0"/>
+              <a:t>• TIPOS DE CASILLEROS:</a:t>
+            </a:r>
+          </a:p>
+          <a:p>
+            <a:pPr marL="0" indent="0">
+              <a:buNone/>
+            </a:pPr>
+            <a:r>
+              <a:rPr lang="es-MX" sz="1600" dirty="0"/>
+              <a:t>  - CasilleroVacio: casillero normal</a:t>
+            </a:r>
+          </a:p>
+          <a:p>
+            <a:pPr marL="0" indent="0">
+              <a:buNone/>
+            </a:pPr>
+            <a:r>
+              <a:rPr lang="es-MX" sz="1600" dirty="0"/>
+              <a:t>  - PremioLetra: multiplica puntos de la letra (2x, 3x)</a:t>
+            </a:r>
+          </a:p>
+          <a:p>
+            <a:pPr marL="0" indent="0">
+              <a:buNone/>
+            </a:pPr>
+            <a:r>
+              <a:rPr lang="es-MX" sz="1600" dirty="0"/>
+              <a:t>  - PremioPalabra: multiplica puntos de toda la palabra (2x, 3x)</a:t>
+            </a:r>
+          </a:p>
+          <a:p>
+            <a:pPr marL="0" indent="0">
+              <a:buNone/>
+            </a:pPr>
+            <a:r>
+              <a:rPr lang="es-MX" sz="1600" dirty="0"/>
+              <a:t>• DIFERENCIA: Los premios se aplican dinámicamente al colocar palabras</a:t>
+            </a:r>
+          </a:p>
+          <a:p>
+            <a:pPr marL="0" indent="0">
+              <a:buNone/>
+            </a:pPr>
+            <a:r>
+              <a:rPr lang="es-MX" sz="1600" dirty="0"/>
+              <a:t>• POSICIONAMIENTO: Sistema de coordenadas (X,Y) de 1 a 15 visible al usuario, internamente 0-15</a:t>
+            </a:r>
+          </a:p>
+        </p:txBody>
+      </p:sp>
+    </p:spTree>
+    <p:extLst>
+      <p:ext uri="{BB962C8B-B14F-4D97-AF65-F5344CB8AC3E}">
+        <p14:creationId xmlns:p14="http://schemas.microsoft.com/office/powerpoint/2010/main" val="363514011"/>
+      </p:ext>
+    </p:extLst>
+  </p:cSld>
+  <p:clrMapOvr>
+    <a:masterClrMapping/>
+  </p:clrMapOvr>
+</p:sld>
+</file>
+
+<file path=ppt/slides/slide39.xml><?xml version="1.0" encoding="utf-8"?>
+<p:sld xmlns:a="http://schemas.openxmlformats.org/drawingml/2006/main" xmlns:r="http://schemas.openxmlformats.org/officeDocument/2006/relationships" xmlns:p="http://schemas.openxmlformats.org/presentationml/2006/main">
+  <p:cSld>
+    <p:spTree>
+      <p:nvGrpSpPr>
+        <p:cNvPr id="1" name="">
+          <a:extLst>
+            <a:ext uri="{FF2B5EF4-FFF2-40B4-BE49-F238E27FC236}">
+              <a16:creationId xmlns:a16="http://schemas.microsoft.com/office/drawing/2014/main" id="{95493666-A7C0-489F-F4BF-7796ADD91FE4}"/>
+            </a:ext>
+          </a:extLst>
+        </p:cNvPr>
+        <p:cNvGrpSpPr/>
+        <p:nvPr/>
+      </p:nvGrpSpPr>
+      <p:grpSpPr>
+        <a:xfrm>
+          <a:off x="0" y="0"/>
+          <a:ext cx="0" cy="0"/>
+          <a:chOff x="0" y="0"/>
+          <a:chExt cx="0" cy="0"/>
+        </a:xfrm>
+      </p:grpSpPr>
+      <p:sp>
+        <p:nvSpPr>
+          <p:cNvPr id="2" name="Title 1">
+            <a:extLst>
+              <a:ext uri="{FF2B5EF4-FFF2-40B4-BE49-F238E27FC236}">
+                <a16:creationId xmlns:a16="http://schemas.microsoft.com/office/drawing/2014/main" id="{A261938B-42E4-CC38-54F7-CC305F53E287}"/>
+              </a:ext>
+            </a:extLst>
+          </p:cNvPr>
+          <p:cNvSpPr>
+            <a:spLocks noGrp="1"/>
+          </p:cNvSpPr>
+          <p:nvPr>
+            <p:ph type="title"/>
+          </p:nvPr>
+        </p:nvSpPr>
+        <p:spPr/>
+        <p:txBody>
+          <a:bodyPr/>
+          <a:lstStyle/>
+          <a:p>
+            <a:r>
+              <a:rPr lang="es-AR" dirty="0"/>
+              <a:t>FUNCIONALIDADES: FICHAS-BOLSA</a:t>
+            </a:r>
+          </a:p>
+        </p:txBody>
+      </p:sp>
+      <p:sp>
+        <p:nvSpPr>
+          <p:cNvPr id="3" name="Content Placeholder 2">
+            <a:extLst>
+              <a:ext uri="{FF2B5EF4-FFF2-40B4-BE49-F238E27FC236}">
+                <a16:creationId xmlns:a16="http://schemas.microsoft.com/office/drawing/2014/main" id="{6B7039B9-8429-2BC8-3B5F-347751075AE3}"/>
+              </a:ext>
+            </a:extLst>
+          </p:cNvPr>
+          <p:cNvSpPr>
+            <a:spLocks noGrp="1"/>
+          </p:cNvSpPr>
+          <p:nvPr>
+            <p:ph idx="1"/>
+          </p:nvPr>
+        </p:nvSpPr>
+        <p:spPr>
+          <a:xfrm>
+            <a:off x="1122830" y="2468031"/>
+            <a:ext cx="8825659" cy="3895061"/>
+          </a:xfrm>
+        </p:spPr>
+        <p:txBody>
+          <a:bodyPr>
+            <a:normAutofit/>
+          </a:bodyPr>
+          <a:lstStyle/>
+          <a:p>
+            <a:pPr marL="0" indent="0">
+              <a:buNone/>
+            </a:pPr>
+            <a:r>
+              <a:rPr lang="es-MX" sz="1600" b="1" dirty="0"/>
+              <a:t>GESTIÓN DE FICHAS CON BOLSA</a:t>
+            </a:r>
+          </a:p>
+          <a:p>
+            <a:pPr marL="0" indent="0">
+              <a:buNone/>
+            </a:pPr>
+            <a:r>
+              <a:rPr lang="es-MX" sz="1600" dirty="0"/>
+              <a:t>• CLASE BolsaFichas: HashMap que simula la bolsa física del juego</a:t>
+            </a:r>
+          </a:p>
+          <a:p>
+            <a:pPr marL="0" indent="0">
+              <a:buNone/>
+            </a:pPr>
+            <a:r>
+              <a:rPr lang="es-MX" sz="1600" dirty="0"/>
+              <a:t>• DISTRIBUCIÓN: 100 fichas total con frecuencias específicas del español (12 A's, 12 E's, etc.)</a:t>
+            </a:r>
+          </a:p>
+          <a:p>
+            <a:pPr marL="0" indent="0">
+              <a:buNone/>
+            </a:pPr>
+            <a:r>
+              <a:rPr lang="es-MX" sz="1600" dirty="0"/>
+              <a:t>• FUNCIONALIDAD ÚNICA: </a:t>
+            </a:r>
+          </a:p>
+          <a:p>
+            <a:pPr marL="0" indent="0">
+              <a:buNone/>
+            </a:pPr>
+            <a:r>
+              <a:rPr lang="es-MX" sz="1600" dirty="0"/>
+              <a:t>  - Intercambio de fichas durante el turno (devolver a bolsa + tomar nuevas)</a:t>
+            </a:r>
+          </a:p>
+          <a:p>
+            <a:pPr marL="0" indent="0">
+              <a:buNone/>
+            </a:pPr>
+            <a:r>
+              <a:rPr lang="es-MX" sz="1600" dirty="0"/>
+              <a:t>  - Completado automático del atril después de jugar palabras</a:t>
+            </a:r>
+          </a:p>
+          <a:p>
+            <a:pPr marL="0" indent="0">
+              <a:buNone/>
+            </a:pPr>
+            <a:r>
+              <a:rPr lang="es-MX" sz="1600" dirty="0"/>
+              <a:t>  - Validación de disponibilidad antes de repartir</a:t>
+            </a:r>
+          </a:p>
+        </p:txBody>
+      </p:sp>
+    </p:spTree>
+    <p:extLst>
+      <p:ext uri="{BB962C8B-B14F-4D97-AF65-F5344CB8AC3E}">
+        <p14:creationId xmlns:p14="http://schemas.microsoft.com/office/powerpoint/2010/main" val="1797609248"/>
       </p:ext>
     </p:extLst>
   </p:cSld>
@@ -18011,6 +18315,1531 @@
 </p:sld>
 </file>
 
+<file path=ppt/slides/slide40.xml><?xml version="1.0" encoding="utf-8"?>
+<p:sld xmlns:a="http://schemas.openxmlformats.org/drawingml/2006/main" xmlns:r="http://schemas.openxmlformats.org/officeDocument/2006/relationships" xmlns:p="http://schemas.openxmlformats.org/presentationml/2006/main">
+  <p:cSld>
+    <p:spTree>
+      <p:nvGrpSpPr>
+        <p:cNvPr id="1" name="">
+          <a:extLst>
+            <a:ext uri="{FF2B5EF4-FFF2-40B4-BE49-F238E27FC236}">
+              <a16:creationId xmlns:a16="http://schemas.microsoft.com/office/drawing/2014/main" id="{98C54B47-3750-1DCB-B55C-5D001CC7F016}"/>
+            </a:ext>
+          </a:extLst>
+        </p:cNvPr>
+        <p:cNvGrpSpPr/>
+        <p:nvPr/>
+      </p:nvGrpSpPr>
+      <p:grpSpPr>
+        <a:xfrm>
+          <a:off x="0" y="0"/>
+          <a:ext cx="0" cy="0"/>
+          <a:chOff x="0" y="0"/>
+          <a:chExt cx="0" cy="0"/>
+        </a:xfrm>
+      </p:grpSpPr>
+      <p:sp>
+        <p:nvSpPr>
+          <p:cNvPr id="2" name="Title 1">
+            <a:extLst>
+              <a:ext uri="{FF2B5EF4-FFF2-40B4-BE49-F238E27FC236}">
+                <a16:creationId xmlns:a16="http://schemas.microsoft.com/office/drawing/2014/main" id="{8762F116-860B-1EC0-3FF8-4D2567853371}"/>
+              </a:ext>
+            </a:extLst>
+          </p:cNvPr>
+          <p:cNvSpPr>
+            <a:spLocks noGrp="1"/>
+          </p:cNvSpPr>
+          <p:nvPr>
+            <p:ph type="title"/>
+          </p:nvPr>
+        </p:nvSpPr>
+        <p:spPr/>
+        <p:txBody>
+          <a:bodyPr/>
+          <a:lstStyle/>
+          <a:p>
+            <a:r>
+              <a:rPr lang="es-AR" dirty="0"/>
+              <a:t>FUNCIONALIDADES: DICCIONARIO</a:t>
+            </a:r>
+          </a:p>
+        </p:txBody>
+      </p:sp>
+      <p:sp>
+        <p:nvSpPr>
+          <p:cNvPr id="3" name="Content Placeholder 2">
+            <a:extLst>
+              <a:ext uri="{FF2B5EF4-FFF2-40B4-BE49-F238E27FC236}">
+                <a16:creationId xmlns:a16="http://schemas.microsoft.com/office/drawing/2014/main" id="{FEADDEEE-BC56-4CD6-B94B-7841731CB0C5}"/>
+              </a:ext>
+            </a:extLst>
+          </p:cNvPr>
+          <p:cNvSpPr>
+            <a:spLocks noGrp="1"/>
+          </p:cNvSpPr>
+          <p:nvPr>
+            <p:ph idx="1"/>
+          </p:nvPr>
+        </p:nvSpPr>
+        <p:spPr>
+          <a:xfrm>
+            <a:off x="1122830" y="2468031"/>
+            <a:ext cx="8825659" cy="3895061"/>
+          </a:xfrm>
+        </p:spPr>
+        <p:txBody>
+          <a:bodyPr>
+            <a:normAutofit/>
+          </a:bodyPr>
+          <a:lstStyle/>
+          <a:p>
+            <a:pPr marL="0" indent="0">
+              <a:buNone/>
+            </a:pPr>
+            <a:r>
+              <a:rPr lang="es-MX" sz="1600" b="1" dirty="0"/>
+              <a:t>SISTEMA DE DICCIONARIO</a:t>
+            </a:r>
+          </a:p>
+          <a:p>
+            <a:pPr marL="0" indent="0">
+              <a:buNone/>
+            </a:pPr>
+            <a:r>
+              <a:rPr lang="es-MX" sz="1600" dirty="0"/>
+              <a:t>• ESTRUCTURA: Diccionario dividido en 4 archivos por rangos alfabéticos</a:t>
+            </a:r>
+          </a:p>
+          <a:p>
+            <a:pPr marL="0" indent="0">
+              <a:buNone/>
+            </a:pPr>
+            <a:r>
+              <a:rPr lang="es-MX" sz="1600" dirty="0"/>
+              <a:t>  - A-F.txt (375,945+ palabras)</a:t>
+            </a:r>
+          </a:p>
+          <a:p>
+            <a:pPr marL="0" indent="0">
+              <a:buNone/>
+            </a:pPr>
+            <a:r>
+              <a:rPr lang="es-MX" sz="1600" dirty="0"/>
+              <a:t>  - G-M.txt</a:t>
+            </a:r>
+          </a:p>
+          <a:p>
+            <a:pPr marL="0" indent="0">
+              <a:buNone/>
+            </a:pPr>
+            <a:r>
+              <a:rPr lang="es-MX" sz="1600" dirty="0"/>
+              <a:t>  - N-S.txt  </a:t>
+            </a:r>
+          </a:p>
+          <a:p>
+            <a:pPr marL="0" indent="0">
+              <a:buNone/>
+            </a:pPr>
+            <a:r>
+              <a:rPr lang="es-MX" sz="1600" dirty="0"/>
+              <a:t>  - T-Z.txt</a:t>
+            </a:r>
+          </a:p>
+          <a:p>
+            <a:pPr marL="0" indent="0">
+              <a:buNone/>
+            </a:pPr>
+            <a:r>
+              <a:rPr lang="es-MX" sz="1600" dirty="0"/>
+              <a:t>• PATRÓN SINGLETON: </a:t>
+            </a:r>
+            <a:r>
+              <a:rPr lang="es-MX" sz="1600" dirty="0" err="1"/>
+              <a:t>DiccionarioFactory</a:t>
+            </a:r>
+            <a:r>
+              <a:rPr lang="es-MX" sz="1600" dirty="0"/>
+              <a:t> garantiza una única instancia</a:t>
+            </a:r>
+          </a:p>
+          <a:p>
+            <a:pPr marL="0" indent="0">
+              <a:buNone/>
+            </a:pPr>
+            <a:r>
+              <a:rPr lang="es-MX" sz="1600" dirty="0"/>
+              <a:t>• FUNCIONALIDAD: Validación de palabras formadas en el tablero</a:t>
+            </a:r>
+          </a:p>
+          <a:p>
+            <a:pPr marL="0" indent="0">
+              <a:buNone/>
+            </a:pPr>
+            <a:r>
+              <a:rPr lang="es-MX" sz="1600" dirty="0"/>
+              <a:t>• EFICIENCIA: Evita carga masiva de memoria (solo lee archivo necesario)</a:t>
+            </a:r>
+          </a:p>
+        </p:txBody>
+      </p:sp>
+    </p:spTree>
+    <p:extLst>
+      <p:ext uri="{BB962C8B-B14F-4D97-AF65-F5344CB8AC3E}">
+        <p14:creationId xmlns:p14="http://schemas.microsoft.com/office/powerpoint/2010/main" val="1838756113"/>
+      </p:ext>
+    </p:extLst>
+  </p:cSld>
+  <p:clrMapOvr>
+    <a:masterClrMapping/>
+  </p:clrMapOvr>
+</p:sld>
+</file>
+
+<file path=ppt/slides/slide41.xml><?xml version="1.0" encoding="utf-8"?>
+<p:sld xmlns:a="http://schemas.openxmlformats.org/drawingml/2006/main" xmlns:r="http://schemas.openxmlformats.org/officeDocument/2006/relationships" xmlns:p="http://schemas.openxmlformats.org/presentationml/2006/main">
+  <p:cSld>
+    <p:spTree>
+      <p:nvGrpSpPr>
+        <p:cNvPr id="1" name="">
+          <a:extLst>
+            <a:ext uri="{FF2B5EF4-FFF2-40B4-BE49-F238E27FC236}">
+              <a16:creationId xmlns:a16="http://schemas.microsoft.com/office/drawing/2014/main" id="{7813F1E8-C06A-135E-D7CC-806C5F00588D}"/>
+            </a:ext>
+          </a:extLst>
+        </p:cNvPr>
+        <p:cNvGrpSpPr/>
+        <p:nvPr/>
+      </p:nvGrpSpPr>
+      <p:grpSpPr>
+        <a:xfrm>
+          <a:off x="0" y="0"/>
+          <a:ext cx="0" cy="0"/>
+          <a:chOff x="0" y="0"/>
+          <a:chExt cx="0" cy="0"/>
+        </a:xfrm>
+      </p:grpSpPr>
+      <p:sp>
+        <p:nvSpPr>
+          <p:cNvPr id="2" name="Title 1">
+            <a:extLst>
+              <a:ext uri="{FF2B5EF4-FFF2-40B4-BE49-F238E27FC236}">
+                <a16:creationId xmlns:a16="http://schemas.microsoft.com/office/drawing/2014/main" id="{2916E2AA-BB6C-8702-3F7D-694510A4F55B}"/>
+              </a:ext>
+            </a:extLst>
+          </p:cNvPr>
+          <p:cNvSpPr>
+            <a:spLocks noGrp="1"/>
+          </p:cNvSpPr>
+          <p:nvPr>
+            <p:ph type="title"/>
+          </p:nvPr>
+        </p:nvSpPr>
+        <p:spPr/>
+        <p:txBody>
+          <a:bodyPr/>
+          <a:lstStyle/>
+          <a:p>
+            <a:r>
+              <a:rPr lang="es-AR" dirty="0"/>
+              <a:t>FUNCIONALIDADES: PUNTAJE</a:t>
+            </a:r>
+          </a:p>
+        </p:txBody>
+      </p:sp>
+      <p:sp>
+        <p:nvSpPr>
+          <p:cNvPr id="3" name="Content Placeholder 2">
+            <a:extLst>
+              <a:ext uri="{FF2B5EF4-FFF2-40B4-BE49-F238E27FC236}">
+                <a16:creationId xmlns:a16="http://schemas.microsoft.com/office/drawing/2014/main" id="{F8F9914E-D92E-E408-457B-0B1D1003190E}"/>
+              </a:ext>
+            </a:extLst>
+          </p:cNvPr>
+          <p:cNvSpPr>
+            <a:spLocks noGrp="1"/>
+          </p:cNvSpPr>
+          <p:nvPr>
+            <p:ph idx="1"/>
+          </p:nvPr>
+        </p:nvSpPr>
+        <p:spPr>
+          <a:xfrm>
+            <a:off x="1122830" y="2468031"/>
+            <a:ext cx="8825659" cy="3895061"/>
+          </a:xfrm>
+        </p:spPr>
+        <p:txBody>
+          <a:bodyPr>
+            <a:normAutofit/>
+          </a:bodyPr>
+          <a:lstStyle/>
+          <a:p>
+            <a:pPr marL="0" indent="0">
+              <a:buNone/>
+            </a:pPr>
+            <a:r>
+              <a:rPr lang="es-MX" sz="1600" b="1" dirty="0"/>
+              <a:t>SISTEMA DE PUNTAJES</a:t>
+            </a:r>
+          </a:p>
+          <a:p>
+            <a:pPr marL="0" indent="0">
+              <a:buNone/>
+            </a:pPr>
+            <a:r>
+              <a:rPr lang="es-MX" sz="1600" dirty="0"/>
+              <a:t>• CLASE PuntajeFichas: HashMap con valores específicos del español</a:t>
+            </a:r>
+          </a:p>
+          <a:p>
+            <a:pPr marL="0" indent="0">
+              <a:buNone/>
+            </a:pPr>
+            <a:r>
+              <a:rPr lang="es-MX" sz="1600" dirty="0"/>
+              <a:t>• PUNTAJES DIFERENCIADOS:</a:t>
+            </a:r>
+          </a:p>
+          <a:p>
+            <a:pPr marL="0" indent="0">
+              <a:buNone/>
+            </a:pPr>
+            <a:r>
+              <a:rPr lang="es-MX" sz="1600" dirty="0"/>
+              <a:t>  - Vocales comunes: A,E,I,O,U = 1 punto</a:t>
+            </a:r>
+          </a:p>
+          <a:p>
+            <a:pPr marL="0" indent="0">
+              <a:buNone/>
+            </a:pPr>
+            <a:r>
+              <a:rPr lang="es-MX" sz="1600" dirty="0"/>
+              <a:t>  - Consonantes raras: J,X,Ñ = 8 puntos</a:t>
+            </a:r>
+          </a:p>
+          <a:p>
+            <a:pPr marL="0" indent="0">
+              <a:buNone/>
+            </a:pPr>
+            <a:r>
+              <a:rPr lang="es-MX" sz="1600" dirty="0"/>
+              <a:t>  - Consonante más rara: Z = 10 puntos</a:t>
+            </a:r>
+          </a:p>
+          <a:p>
+            <a:pPr marL="0" indent="0">
+              <a:buNone/>
+            </a:pPr>
+            <a:r>
+              <a:rPr lang="es-MX" sz="1600" dirty="0"/>
+              <a:t>• FUNCIONALIDAD: Cada ficha tiene su valor inherente independiente del tablero</a:t>
+            </a:r>
+          </a:p>
+          <a:p>
+            <a:pPr marL="0" indent="0">
+              <a:buNone/>
+            </a:pPr>
+            <a:r>
+              <a:rPr lang="es-MX" sz="1600" dirty="0"/>
+              <a:t>• DIFERENCIA SCRABBLE: Sistema único vs juegos con puntos fijos por ficha</a:t>
+            </a:r>
+          </a:p>
+        </p:txBody>
+      </p:sp>
+    </p:spTree>
+    <p:extLst>
+      <p:ext uri="{BB962C8B-B14F-4D97-AF65-F5344CB8AC3E}">
+        <p14:creationId xmlns:p14="http://schemas.microsoft.com/office/powerpoint/2010/main" val="1076150982"/>
+      </p:ext>
+    </p:extLst>
+  </p:cSld>
+  <p:clrMapOvr>
+    <a:masterClrMapping/>
+  </p:clrMapOvr>
+</p:sld>
+</file>
+
+<file path=ppt/slides/slide42.xml><?xml version="1.0" encoding="utf-8"?>
+<p:sld xmlns:a="http://schemas.openxmlformats.org/drawingml/2006/main" xmlns:r="http://schemas.openxmlformats.org/officeDocument/2006/relationships" xmlns:p="http://schemas.openxmlformats.org/presentationml/2006/main">
+  <p:cSld>
+    <p:spTree>
+      <p:nvGrpSpPr>
+        <p:cNvPr id="1" name="">
+          <a:extLst>
+            <a:ext uri="{FF2B5EF4-FFF2-40B4-BE49-F238E27FC236}">
+              <a16:creationId xmlns:a16="http://schemas.microsoft.com/office/drawing/2014/main" id="{AE44D05F-B0AE-7F9D-CAC1-144157BB1FE6}"/>
+            </a:ext>
+          </a:extLst>
+        </p:cNvPr>
+        <p:cNvGrpSpPr/>
+        <p:nvPr/>
+      </p:nvGrpSpPr>
+      <p:grpSpPr>
+        <a:xfrm>
+          <a:off x="0" y="0"/>
+          <a:ext cx="0" cy="0"/>
+          <a:chOff x="0" y="0"/>
+          <a:chExt cx="0" cy="0"/>
+        </a:xfrm>
+      </p:grpSpPr>
+      <p:sp>
+        <p:nvSpPr>
+          <p:cNvPr id="2" name="Title 1">
+            <a:extLst>
+              <a:ext uri="{FF2B5EF4-FFF2-40B4-BE49-F238E27FC236}">
+                <a16:creationId xmlns:a16="http://schemas.microsoft.com/office/drawing/2014/main" id="{A93FA765-422C-4670-423B-7B6626C494A7}"/>
+              </a:ext>
+            </a:extLst>
+          </p:cNvPr>
+          <p:cNvSpPr>
+            <a:spLocks noGrp="1"/>
+          </p:cNvSpPr>
+          <p:nvPr>
+            <p:ph type="title"/>
+          </p:nvPr>
+        </p:nvSpPr>
+        <p:spPr/>
+        <p:txBody>
+          <a:bodyPr/>
+          <a:lstStyle/>
+          <a:p>
+            <a:r>
+              <a:rPr lang="es-AR" dirty="0"/>
+              <a:t>FUNCIONALIDADES: FICHAS ÚNICAS</a:t>
+            </a:r>
+          </a:p>
+        </p:txBody>
+      </p:sp>
+      <p:sp>
+        <p:nvSpPr>
+          <p:cNvPr id="3" name="Content Placeholder 2">
+            <a:extLst>
+              <a:ext uri="{FF2B5EF4-FFF2-40B4-BE49-F238E27FC236}">
+                <a16:creationId xmlns:a16="http://schemas.microsoft.com/office/drawing/2014/main" id="{0668D5FD-FAC7-1E59-3449-71865D2F1F67}"/>
+              </a:ext>
+            </a:extLst>
+          </p:cNvPr>
+          <p:cNvSpPr>
+            <a:spLocks noGrp="1"/>
+          </p:cNvSpPr>
+          <p:nvPr>
+            <p:ph idx="1"/>
+          </p:nvPr>
+        </p:nvSpPr>
+        <p:spPr>
+          <a:xfrm>
+            <a:off x="1122830" y="2468031"/>
+            <a:ext cx="8825659" cy="3895061"/>
+          </a:xfrm>
+        </p:spPr>
+        <p:txBody>
+          <a:bodyPr>
+            <a:normAutofit/>
+          </a:bodyPr>
+          <a:lstStyle/>
+          <a:p>
+            <a:pPr marL="0" indent="0">
+              <a:buNone/>
+            </a:pPr>
+            <a:r>
+              <a:rPr lang="es-MX" sz="1600" b="1" dirty="0"/>
+              <a:t>FICHAS CON IDENTIDAD ÚNICA</a:t>
+            </a:r>
+          </a:p>
+          <a:p>
+            <a:pPr marL="0" indent="0">
+              <a:buNone/>
+            </a:pPr>
+            <a:r>
+              <a:rPr lang="es-MX" sz="1600" dirty="0"/>
+              <a:t>• CADA LETRA ES UN OBJETO: Clase Letra implementa Casillero</a:t>
+            </a:r>
+          </a:p>
+          <a:p>
+            <a:pPr marL="0" indent="0">
+              <a:buNone/>
+            </a:pPr>
+            <a:r>
+              <a:rPr lang="es-MX" sz="1600" dirty="0"/>
+              <a:t>• ID ÚNICO POR FICHA: Contador estático sincronizado genera </a:t>
+            </a:r>
+            <a:r>
+              <a:rPr lang="es-MX" sz="1600" dirty="0" err="1"/>
+              <a:t>IDs</a:t>
+            </a:r>
+            <a:r>
+              <a:rPr lang="es-MX" sz="1600" dirty="0"/>
+              <a:t> únicos</a:t>
+            </a:r>
+          </a:p>
+          <a:p>
+            <a:pPr marL="0" indent="0">
+              <a:buNone/>
+            </a:pPr>
+            <a:r>
+              <a:rPr lang="es-MX" sz="1600" dirty="0"/>
+              <a:t>• RASTREABILIDAD: Cada ficha puede ser identificada individualmente</a:t>
+            </a:r>
+          </a:p>
+          <a:p>
+            <a:pPr marL="0" indent="0">
+              <a:buNone/>
+            </a:pPr>
+            <a:r>
+              <a:rPr lang="es-MX" sz="1600" dirty="0"/>
+              <a:t>• FUNCIONALIDAD CORE: Permite seguimiento exacto de fichas intercambiadas</a:t>
+            </a:r>
+          </a:p>
+          <a:p>
+            <a:pPr marL="0" indent="0">
+              <a:buNone/>
+            </a:pPr>
+            <a:r>
+              <a:rPr lang="es-MX" sz="1600" dirty="0"/>
+              <a:t>• DIFERENCIA: Vs sistemas simples que solo manejan </a:t>
+            </a:r>
+            <a:r>
+              <a:rPr lang="es-MX" sz="1600" dirty="0" err="1"/>
+              <a:t>strings</a:t>
+            </a:r>
+            <a:r>
+              <a:rPr lang="es-MX" sz="1600" dirty="0"/>
+              <a:t> de letras</a:t>
+            </a:r>
+          </a:p>
+        </p:txBody>
+      </p:sp>
+    </p:spTree>
+    <p:extLst>
+      <p:ext uri="{BB962C8B-B14F-4D97-AF65-F5344CB8AC3E}">
+        <p14:creationId xmlns:p14="http://schemas.microsoft.com/office/powerpoint/2010/main" val="2712705716"/>
+      </p:ext>
+    </p:extLst>
+  </p:cSld>
+  <p:clrMapOvr>
+    <a:masterClrMapping/>
+  </p:clrMapOvr>
+</p:sld>
+</file>
+
+<file path=ppt/slides/slide43.xml><?xml version="1.0" encoding="utf-8"?>
+<p:sld xmlns:a="http://schemas.openxmlformats.org/drawingml/2006/main" xmlns:r="http://schemas.openxmlformats.org/officeDocument/2006/relationships" xmlns:p="http://schemas.openxmlformats.org/presentationml/2006/main">
+  <p:cSld>
+    <p:spTree>
+      <p:nvGrpSpPr>
+        <p:cNvPr id="1" name="">
+          <a:extLst>
+            <a:ext uri="{FF2B5EF4-FFF2-40B4-BE49-F238E27FC236}">
+              <a16:creationId xmlns:a16="http://schemas.microsoft.com/office/drawing/2014/main" id="{7084E4D8-3A16-DC27-8FAD-69061CE7ABA9}"/>
+            </a:ext>
+          </a:extLst>
+        </p:cNvPr>
+        <p:cNvGrpSpPr/>
+        <p:nvPr/>
+      </p:nvGrpSpPr>
+      <p:grpSpPr>
+        <a:xfrm>
+          <a:off x="0" y="0"/>
+          <a:ext cx="0" cy="0"/>
+          <a:chOff x="0" y="0"/>
+          <a:chExt cx="0" cy="0"/>
+        </a:xfrm>
+      </p:grpSpPr>
+      <p:sp>
+        <p:nvSpPr>
+          <p:cNvPr id="2" name="Title 1">
+            <a:extLst>
+              <a:ext uri="{FF2B5EF4-FFF2-40B4-BE49-F238E27FC236}">
+                <a16:creationId xmlns:a16="http://schemas.microsoft.com/office/drawing/2014/main" id="{4CB95A45-DD77-8D69-004A-81E6616D9DC5}"/>
+              </a:ext>
+            </a:extLst>
+          </p:cNvPr>
+          <p:cNvSpPr>
+            <a:spLocks noGrp="1"/>
+          </p:cNvSpPr>
+          <p:nvPr>
+            <p:ph type="title"/>
+          </p:nvPr>
+        </p:nvSpPr>
+        <p:spPr/>
+        <p:txBody>
+          <a:bodyPr/>
+          <a:lstStyle/>
+          <a:p>
+            <a:r>
+              <a:rPr lang="es-AR" dirty="0"/>
+              <a:t>FUNCIONALIDADES: VALIDACIÓN DE PALABRAS</a:t>
+            </a:r>
+          </a:p>
+        </p:txBody>
+      </p:sp>
+      <p:sp>
+        <p:nvSpPr>
+          <p:cNvPr id="3" name="Content Placeholder 2">
+            <a:extLst>
+              <a:ext uri="{FF2B5EF4-FFF2-40B4-BE49-F238E27FC236}">
+                <a16:creationId xmlns:a16="http://schemas.microsoft.com/office/drawing/2014/main" id="{6E815BF1-7F7A-7060-49A1-71C212D48D5F}"/>
+              </a:ext>
+            </a:extLst>
+          </p:cNvPr>
+          <p:cNvSpPr>
+            <a:spLocks noGrp="1"/>
+          </p:cNvSpPr>
+          <p:nvPr>
+            <p:ph idx="1"/>
+          </p:nvPr>
+        </p:nvSpPr>
+        <p:spPr>
+          <a:xfrm>
+            <a:off x="1122830" y="2468031"/>
+            <a:ext cx="8825659" cy="3895061"/>
+          </a:xfrm>
+        </p:spPr>
+        <p:txBody>
+          <a:bodyPr>
+            <a:normAutofit/>
+          </a:bodyPr>
+          <a:lstStyle/>
+          <a:p>
+            <a:pPr marL="0" indent="0">
+              <a:buNone/>
+            </a:pPr>
+            <a:r>
+              <a:rPr lang="es-MX" sz="1600" b="1" dirty="0"/>
+              <a:t>VALIDACIÓN DE PALABRAS</a:t>
+            </a:r>
+          </a:p>
+          <a:p>
+            <a:pPr marL="0" indent="0">
+              <a:buNone/>
+            </a:pPr>
+            <a:r>
+              <a:rPr lang="es-MX" sz="1600" dirty="0"/>
+              <a:t>• NIVEL 1: Validación de letras en atril del jugador</a:t>
+            </a:r>
+          </a:p>
+          <a:p>
+            <a:pPr marL="0" indent="0">
+              <a:buNone/>
+            </a:pPr>
+            <a:r>
+              <a:rPr lang="es-MX" sz="1600" dirty="0"/>
+              <a:t>• NIVEL 2: Consulta al diccionario (archivos de texto divididos A-F, G-M, N-S, T-Z)</a:t>
+            </a:r>
+          </a:p>
+          <a:p>
+            <a:pPr marL="0" indent="0">
+              <a:buNone/>
+            </a:pPr>
+            <a:r>
+              <a:rPr lang="es-MX" sz="1600" dirty="0"/>
+              <a:t>• NIVEL 3: Validación de posicionamiento en tablero</a:t>
+            </a:r>
+          </a:p>
+          <a:p>
+            <a:pPr marL="0" indent="0">
+              <a:buNone/>
+            </a:pPr>
+            <a:r>
+              <a:rPr lang="es-MX" sz="1600" dirty="0"/>
+              <a:t>• NIVEL 4: Verificación de conexión con palabras existentes</a:t>
+            </a:r>
+          </a:p>
+          <a:p>
+            <a:pPr marL="0" indent="0">
+              <a:buNone/>
+            </a:pPr>
+            <a:r>
+              <a:rPr lang="es-MX" sz="1600" dirty="0"/>
+              <a:t>• CARACTERÍSTICA ESPECIAL: Primer movimiento debe pasar por el centro (8,8)</a:t>
+            </a:r>
+          </a:p>
+        </p:txBody>
+      </p:sp>
+    </p:spTree>
+    <p:extLst>
+      <p:ext uri="{BB962C8B-B14F-4D97-AF65-F5344CB8AC3E}">
+        <p14:creationId xmlns:p14="http://schemas.microsoft.com/office/powerpoint/2010/main" val="313816787"/>
+      </p:ext>
+    </p:extLst>
+  </p:cSld>
+  <p:clrMapOvr>
+    <a:masterClrMapping/>
+  </p:clrMapOvr>
+</p:sld>
+</file>
+
+<file path=ppt/slides/slide44.xml><?xml version="1.0" encoding="utf-8"?>
+<p:sld xmlns:a="http://schemas.openxmlformats.org/drawingml/2006/main" xmlns:r="http://schemas.openxmlformats.org/officeDocument/2006/relationships" xmlns:p="http://schemas.openxmlformats.org/presentationml/2006/main">
+  <p:cSld>
+    <p:spTree>
+      <p:nvGrpSpPr>
+        <p:cNvPr id="1" name="">
+          <a:extLst>
+            <a:ext uri="{FF2B5EF4-FFF2-40B4-BE49-F238E27FC236}">
+              <a16:creationId xmlns:a16="http://schemas.microsoft.com/office/drawing/2014/main" id="{72AEAEAA-D1E0-5EDC-A33A-87E6526C3421}"/>
+            </a:ext>
+          </a:extLst>
+        </p:cNvPr>
+        <p:cNvGrpSpPr/>
+        <p:nvPr/>
+      </p:nvGrpSpPr>
+      <p:grpSpPr>
+        <a:xfrm>
+          <a:off x="0" y="0"/>
+          <a:ext cx="0" cy="0"/>
+          <a:chOff x="0" y="0"/>
+          <a:chExt cx="0" cy="0"/>
+        </a:xfrm>
+      </p:grpSpPr>
+      <p:sp>
+        <p:nvSpPr>
+          <p:cNvPr id="2" name="Title 1">
+            <a:extLst>
+              <a:ext uri="{FF2B5EF4-FFF2-40B4-BE49-F238E27FC236}">
+                <a16:creationId xmlns:a16="http://schemas.microsoft.com/office/drawing/2014/main" id="{3BC45E95-5F97-5C5A-102A-783A048F43D4}"/>
+              </a:ext>
+            </a:extLst>
+          </p:cNvPr>
+          <p:cNvSpPr>
+            <a:spLocks noGrp="1"/>
+          </p:cNvSpPr>
+          <p:nvPr>
+            <p:ph type="title"/>
+          </p:nvPr>
+        </p:nvSpPr>
+        <p:spPr/>
+        <p:txBody>
+          <a:bodyPr/>
+          <a:lstStyle/>
+          <a:p>
+            <a:r>
+              <a:rPr lang="es-AR" dirty="0"/>
+              <a:t>FUNCIONALIDADES: CONFIGURACIÓN CENTRALIZADA</a:t>
+            </a:r>
+          </a:p>
+        </p:txBody>
+      </p:sp>
+      <p:sp>
+        <p:nvSpPr>
+          <p:cNvPr id="3" name="Content Placeholder 2">
+            <a:extLst>
+              <a:ext uri="{FF2B5EF4-FFF2-40B4-BE49-F238E27FC236}">
+                <a16:creationId xmlns:a16="http://schemas.microsoft.com/office/drawing/2014/main" id="{C3451481-A2BB-6C45-DACC-49415E8E61A7}"/>
+              </a:ext>
+            </a:extLst>
+          </p:cNvPr>
+          <p:cNvSpPr>
+            <a:spLocks noGrp="1"/>
+          </p:cNvSpPr>
+          <p:nvPr>
+            <p:ph idx="1"/>
+          </p:nvPr>
+        </p:nvSpPr>
+        <p:spPr>
+          <a:xfrm>
+            <a:off x="1122830" y="2468031"/>
+            <a:ext cx="8825659" cy="3895061"/>
+          </a:xfrm>
+        </p:spPr>
+        <p:txBody>
+          <a:bodyPr>
+            <a:normAutofit/>
+          </a:bodyPr>
+          <a:lstStyle/>
+          <a:p>
+            <a:pPr marL="0" indent="0">
+              <a:buNone/>
+            </a:pPr>
+            <a:r>
+              <a:rPr lang="es-MX" sz="1600" b="1" dirty="0"/>
+              <a:t>CONFIGURACIÓN CENTRALIZADA</a:t>
+            </a:r>
+          </a:p>
+          <a:p>
+            <a:pPr marL="0" indent="0">
+              <a:buNone/>
+            </a:pPr>
+            <a:r>
+              <a:rPr lang="es-MX" sz="1600" dirty="0"/>
+              <a:t>• CLASE ConfiguracionJuego: Constantes centralizadas y modificables</a:t>
+            </a:r>
+          </a:p>
+          <a:p>
+            <a:pPr marL="0" indent="0">
+              <a:buNone/>
+            </a:pPr>
+            <a:r>
+              <a:rPr lang="es-MX" sz="1600" dirty="0"/>
+              <a:t>• PARÁMETROS CONFIGURABLES:</a:t>
+            </a:r>
+          </a:p>
+          <a:p>
+            <a:pPr marL="0" indent="0">
+              <a:buNone/>
+            </a:pPr>
+            <a:r>
+              <a:rPr lang="es-MX" sz="1600" dirty="0"/>
+              <a:t>  - Tamaño del tablero (16x16)</a:t>
+            </a:r>
+          </a:p>
+          <a:p>
+            <a:pPr marL="0" indent="0">
+              <a:buNone/>
+            </a:pPr>
+            <a:r>
+              <a:rPr lang="es-MX" sz="1600" dirty="0"/>
+              <a:t>  - Fichas iniciales por jugador (7 fichas)</a:t>
+            </a:r>
+          </a:p>
+          <a:p>
+            <a:pPr marL="0" indent="0">
+              <a:buNone/>
+            </a:pPr>
+            <a:r>
+              <a:rPr lang="es-MX" sz="1600" dirty="0"/>
+              <a:t>  - Coordenadas del centro (8,8)</a:t>
+            </a:r>
+          </a:p>
+          <a:p>
+            <a:pPr marL="0" indent="0">
+              <a:buNone/>
+            </a:pPr>
+            <a:r>
+              <a:rPr lang="es-MX" sz="1600" dirty="0"/>
+              <a:t>  - Máximo de turnos pasados consecutivos (5)</a:t>
+            </a:r>
+          </a:p>
+          <a:p>
+            <a:pPr marL="0" indent="0">
+              <a:buNone/>
+            </a:pPr>
+            <a:r>
+              <a:rPr lang="es-MX" sz="1600" dirty="0"/>
+              <a:t>• VENTAJA SCRABBLE: Reglas complejas centralizadas vs juegos con reglas hardcodeadas</a:t>
+            </a:r>
+          </a:p>
+        </p:txBody>
+      </p:sp>
+    </p:spTree>
+    <p:extLst>
+      <p:ext uri="{BB962C8B-B14F-4D97-AF65-F5344CB8AC3E}">
+        <p14:creationId xmlns:p14="http://schemas.microsoft.com/office/powerpoint/2010/main" val="2810514911"/>
+      </p:ext>
+    </p:extLst>
+  </p:cSld>
+  <p:clrMapOvr>
+    <a:masterClrMapping/>
+  </p:clrMapOvr>
+</p:sld>
+</file>
+
+<file path=ppt/slides/slide45.xml><?xml version="1.0" encoding="utf-8"?>
+<p:sld xmlns:a="http://schemas.openxmlformats.org/drawingml/2006/main" xmlns:r="http://schemas.openxmlformats.org/officeDocument/2006/relationships" xmlns:p="http://schemas.openxmlformats.org/presentationml/2006/main">
+  <p:cSld>
+    <p:spTree>
+      <p:nvGrpSpPr>
+        <p:cNvPr id="1" name="">
+          <a:extLst>
+            <a:ext uri="{FF2B5EF4-FFF2-40B4-BE49-F238E27FC236}">
+              <a16:creationId xmlns:a16="http://schemas.microsoft.com/office/drawing/2014/main" id="{F0076880-3128-F943-9BE0-F17C0A69D9DE}"/>
+            </a:ext>
+          </a:extLst>
+        </p:cNvPr>
+        <p:cNvGrpSpPr/>
+        <p:nvPr/>
+      </p:nvGrpSpPr>
+      <p:grpSpPr>
+        <a:xfrm>
+          <a:off x="0" y="0"/>
+          <a:ext cx="0" cy="0"/>
+          <a:chOff x="0" y="0"/>
+          <a:chExt cx="0" cy="0"/>
+        </a:xfrm>
+      </p:grpSpPr>
+      <p:sp>
+        <p:nvSpPr>
+          <p:cNvPr id="2" name="Title 1">
+            <a:extLst>
+              <a:ext uri="{FF2B5EF4-FFF2-40B4-BE49-F238E27FC236}">
+                <a16:creationId xmlns:a16="http://schemas.microsoft.com/office/drawing/2014/main" id="{40E002F1-EC8B-48CB-C00E-02400329B6A9}"/>
+              </a:ext>
+            </a:extLst>
+          </p:cNvPr>
+          <p:cNvSpPr>
+            <a:spLocks noGrp="1"/>
+          </p:cNvSpPr>
+          <p:nvPr>
+            <p:ph type="title"/>
+          </p:nvPr>
+        </p:nvSpPr>
+        <p:spPr/>
+        <p:txBody>
+          <a:bodyPr/>
+          <a:lstStyle/>
+          <a:p>
+            <a:r>
+              <a:rPr lang="es-AR" dirty="0"/>
+              <a:t>FUNCIONALIDADES: RANKING PERSISTENTE</a:t>
+            </a:r>
+          </a:p>
+        </p:txBody>
+      </p:sp>
+      <p:sp>
+        <p:nvSpPr>
+          <p:cNvPr id="3" name="Content Placeholder 2">
+            <a:extLst>
+              <a:ext uri="{FF2B5EF4-FFF2-40B4-BE49-F238E27FC236}">
+                <a16:creationId xmlns:a16="http://schemas.microsoft.com/office/drawing/2014/main" id="{640F1B83-87DA-4D01-3778-4F68FC913023}"/>
+              </a:ext>
+            </a:extLst>
+          </p:cNvPr>
+          <p:cNvSpPr>
+            <a:spLocks noGrp="1"/>
+          </p:cNvSpPr>
+          <p:nvPr>
+            <p:ph idx="1"/>
+          </p:nvPr>
+        </p:nvSpPr>
+        <p:spPr>
+          <a:xfrm>
+            <a:off x="1122830" y="2468031"/>
+            <a:ext cx="8825659" cy="3895061"/>
+          </a:xfrm>
+        </p:spPr>
+        <p:txBody>
+          <a:bodyPr>
+            <a:normAutofit/>
+          </a:bodyPr>
+          <a:lstStyle/>
+          <a:p>
+            <a:pPr marL="0" indent="0">
+              <a:buNone/>
+            </a:pPr>
+            <a:r>
+              <a:rPr lang="es-MX" sz="1600" b="1" dirty="0"/>
+              <a:t>RANKING PERSISTENTE</a:t>
+            </a:r>
+          </a:p>
+          <a:p>
+            <a:pPr marL="0" indent="0">
+              <a:buNone/>
+            </a:pPr>
+            <a:r>
+              <a:rPr lang="es-MX" sz="1600" dirty="0"/>
+              <a:t>• ALMACENAMIENTO: Archivo binario serializado (RankingJugadores.dat)</a:t>
+            </a:r>
+          </a:p>
+          <a:p>
+            <a:pPr marL="0" indent="0">
+              <a:buNone/>
+            </a:pPr>
+            <a:r>
+              <a:rPr lang="es-MX" sz="1600" dirty="0"/>
+              <a:t>• SERIALIZACIÓN JAVA: Objetos del juego guardados directamente en binario</a:t>
+            </a:r>
+          </a:p>
+          <a:p>
+            <a:pPr marL="0" indent="0">
+              <a:buNone/>
+            </a:pPr>
+            <a:r>
+              <a:rPr lang="es-MX" sz="1600" dirty="0"/>
+              <a:t>• ESTRUCTURA: Top 5 mejores puntajes históricos de todas las partidas</a:t>
+            </a:r>
+          </a:p>
+          <a:p>
+            <a:pPr marL="0" indent="0">
+              <a:buNone/>
+            </a:pPr>
+            <a:r>
+              <a:rPr lang="es-MX" sz="1600" dirty="0"/>
+              <a:t>• PERSISTENCIA: Los logros se mantienen entre sesiones del juego</a:t>
+            </a:r>
+          </a:p>
+        </p:txBody>
+      </p:sp>
+    </p:spTree>
+    <p:extLst>
+      <p:ext uri="{BB962C8B-B14F-4D97-AF65-F5344CB8AC3E}">
+        <p14:creationId xmlns:p14="http://schemas.microsoft.com/office/powerpoint/2010/main" val="298192838"/>
+      </p:ext>
+    </p:extLst>
+  </p:cSld>
+  <p:clrMapOvr>
+    <a:masterClrMapping/>
+  </p:clrMapOvr>
+</p:sld>
+</file>
+
+<file path=ppt/slides/slide46.xml><?xml version="1.0" encoding="utf-8"?>
+<p:sld xmlns:a="http://schemas.openxmlformats.org/drawingml/2006/main" xmlns:r="http://schemas.openxmlformats.org/officeDocument/2006/relationships" xmlns:p="http://schemas.openxmlformats.org/presentationml/2006/main">
+  <p:cSld>
+    <p:spTree>
+      <p:nvGrpSpPr>
+        <p:cNvPr id="1" name="">
+          <a:extLst>
+            <a:ext uri="{FF2B5EF4-FFF2-40B4-BE49-F238E27FC236}">
+              <a16:creationId xmlns:a16="http://schemas.microsoft.com/office/drawing/2014/main" id="{69DDA2DF-9A99-E064-5631-429256AE63B6}"/>
+            </a:ext>
+          </a:extLst>
+        </p:cNvPr>
+        <p:cNvGrpSpPr/>
+        <p:nvPr/>
+      </p:nvGrpSpPr>
+      <p:grpSpPr>
+        <a:xfrm>
+          <a:off x="0" y="0"/>
+          <a:ext cx="0" cy="0"/>
+          <a:chOff x="0" y="0"/>
+          <a:chExt cx="0" cy="0"/>
+        </a:xfrm>
+      </p:grpSpPr>
+      <p:sp>
+        <p:nvSpPr>
+          <p:cNvPr id="2" name="Title 1">
+            <a:extLst>
+              <a:ext uri="{FF2B5EF4-FFF2-40B4-BE49-F238E27FC236}">
+                <a16:creationId xmlns:a16="http://schemas.microsoft.com/office/drawing/2014/main" id="{C54348E5-93BD-627A-D459-CAC42719722B}"/>
+              </a:ext>
+            </a:extLst>
+          </p:cNvPr>
+          <p:cNvSpPr>
+            <a:spLocks noGrp="1"/>
+          </p:cNvSpPr>
+          <p:nvPr>
+            <p:ph type="title"/>
+          </p:nvPr>
+        </p:nvSpPr>
+        <p:spPr/>
+        <p:txBody>
+          <a:bodyPr/>
+          <a:lstStyle/>
+          <a:p>
+            <a:r>
+              <a:rPr lang="es-AR" dirty="0"/>
+              <a:t>FUNCIONALIDADES: FIN DE JUEGO</a:t>
+            </a:r>
+          </a:p>
+        </p:txBody>
+      </p:sp>
+      <p:sp>
+        <p:nvSpPr>
+          <p:cNvPr id="3" name="Content Placeholder 2">
+            <a:extLst>
+              <a:ext uri="{FF2B5EF4-FFF2-40B4-BE49-F238E27FC236}">
+                <a16:creationId xmlns:a16="http://schemas.microsoft.com/office/drawing/2014/main" id="{071DEAE1-386A-A450-D94B-47ABBF36CC17}"/>
+              </a:ext>
+            </a:extLst>
+          </p:cNvPr>
+          <p:cNvSpPr>
+            <a:spLocks noGrp="1"/>
+          </p:cNvSpPr>
+          <p:nvPr>
+            <p:ph idx="1"/>
+          </p:nvPr>
+        </p:nvSpPr>
+        <p:spPr>
+          <a:xfrm>
+            <a:off x="1122830" y="2468031"/>
+            <a:ext cx="8825659" cy="3895061"/>
+          </a:xfrm>
+        </p:spPr>
+        <p:txBody>
+          <a:bodyPr>
+            <a:normAutofit/>
+          </a:bodyPr>
+          <a:lstStyle/>
+          <a:p>
+            <a:pPr marL="0" indent="0">
+              <a:buNone/>
+            </a:pPr>
+            <a:r>
+              <a:rPr lang="es-MX" sz="1600" b="1" dirty="0"/>
+              <a:t>CONTROL DE FIN DE JUEGO MULTICONDICIÓN</a:t>
+            </a:r>
+          </a:p>
+          <a:p>
+            <a:pPr marL="0" indent="0">
+              <a:buNone/>
+            </a:pPr>
+            <a:r>
+              <a:rPr lang="es-MX" sz="1600" dirty="0"/>
+              <a:t>• MÚLTIPLES CONDICIONES DE VICTORIA/DERROTA:</a:t>
+            </a:r>
+          </a:p>
+          <a:p>
+            <a:pPr marL="0" indent="0">
+              <a:buNone/>
+            </a:pPr>
+            <a:r>
+              <a:rPr lang="es-MX" sz="1600" dirty="0"/>
+              <a:t>  - Bolsa de fichas vacía</a:t>
+            </a:r>
+          </a:p>
+          <a:p>
+            <a:pPr marL="0" indent="0">
+              <a:buNone/>
+            </a:pPr>
+            <a:r>
+              <a:rPr lang="es-MX" sz="1600" dirty="0"/>
+              <a:t>  - Jugador sin fichas + bolsa vacía</a:t>
+            </a:r>
+          </a:p>
+          <a:p>
+            <a:pPr marL="0" indent="0">
+              <a:buNone/>
+            </a:pPr>
+            <a:r>
+              <a:rPr lang="es-MX" sz="1600" dirty="0"/>
+              <a:t>  - 5 turnos consecutivos pasados/cambiados</a:t>
+            </a:r>
+          </a:p>
+          <a:p>
+            <a:pPr marL="0" indent="0">
+              <a:buNone/>
+            </a:pPr>
+            <a:r>
+              <a:rPr lang="es-MX" sz="1600" dirty="0"/>
+              <a:t>  - Todos los atriles vacíos (caso extremo)</a:t>
+            </a:r>
+          </a:p>
+          <a:p>
+            <a:pPr marL="0" indent="0">
+              <a:buNone/>
+            </a:pPr>
+            <a:r>
+              <a:rPr lang="es-MX" sz="1600" dirty="0"/>
+              <a:t>• PREVENCIÓN: Sistema sincronizado evita condiciones de carrera</a:t>
+            </a:r>
+          </a:p>
+          <a:p>
+            <a:pPr marL="0" indent="0">
+              <a:buNone/>
+            </a:pPr>
+            <a:r>
+              <a:rPr lang="es-MX" sz="1600" dirty="0"/>
+              <a:t>• CARACTERÍSTICA SCRABBLE: Fin complejo vs juegos con una sola condición</a:t>
+            </a:r>
+          </a:p>
+        </p:txBody>
+      </p:sp>
+    </p:spTree>
+    <p:extLst>
+      <p:ext uri="{BB962C8B-B14F-4D97-AF65-F5344CB8AC3E}">
+        <p14:creationId xmlns:p14="http://schemas.microsoft.com/office/powerpoint/2010/main" val="688355097"/>
+      </p:ext>
+    </p:extLst>
+  </p:cSld>
+  <p:clrMapOvr>
+    <a:masterClrMapping/>
+  </p:clrMapOvr>
+</p:sld>
+</file>
+
+<file path=ppt/slides/slide47.xml><?xml version="1.0" encoding="utf-8"?>
+<p:sld xmlns:a="http://schemas.openxmlformats.org/drawingml/2006/main" xmlns:r="http://schemas.openxmlformats.org/officeDocument/2006/relationships" xmlns:p="http://schemas.openxmlformats.org/presentationml/2006/main">
+  <p:cSld>
+    <p:spTree>
+      <p:nvGrpSpPr>
+        <p:cNvPr id="1" name="">
+          <a:extLst>
+            <a:ext uri="{FF2B5EF4-FFF2-40B4-BE49-F238E27FC236}">
+              <a16:creationId xmlns:a16="http://schemas.microsoft.com/office/drawing/2014/main" id="{EAE69A16-588A-BF11-E1F5-CA0B80009051}"/>
+            </a:ext>
+          </a:extLst>
+        </p:cNvPr>
+        <p:cNvGrpSpPr/>
+        <p:nvPr/>
+      </p:nvGrpSpPr>
+      <p:grpSpPr>
+        <a:xfrm>
+          <a:off x="0" y="0"/>
+          <a:ext cx="0" cy="0"/>
+          <a:chOff x="0" y="0"/>
+          <a:chExt cx="0" cy="0"/>
+        </a:xfrm>
+      </p:grpSpPr>
+      <p:sp>
+        <p:nvSpPr>
+          <p:cNvPr id="2" name="Title 1">
+            <a:extLst>
+              <a:ext uri="{FF2B5EF4-FFF2-40B4-BE49-F238E27FC236}">
+                <a16:creationId xmlns:a16="http://schemas.microsoft.com/office/drawing/2014/main" id="{ACD040C7-1BDD-8954-D238-60B3FC8505ED}"/>
+              </a:ext>
+            </a:extLst>
+          </p:cNvPr>
+          <p:cNvSpPr>
+            <a:spLocks noGrp="1"/>
+          </p:cNvSpPr>
+          <p:nvPr>
+            <p:ph type="title"/>
+          </p:nvPr>
+        </p:nvSpPr>
+        <p:spPr/>
+        <p:txBody>
+          <a:bodyPr/>
+          <a:lstStyle/>
+          <a:p>
+            <a:r>
+              <a:rPr lang="es-AR" dirty="0"/>
+              <a:t>FUNCIONALIDADES: DOBLE INTERFAZ</a:t>
+            </a:r>
+          </a:p>
+        </p:txBody>
+      </p:sp>
+      <p:sp>
+        <p:nvSpPr>
+          <p:cNvPr id="3" name="Content Placeholder 2">
+            <a:extLst>
+              <a:ext uri="{FF2B5EF4-FFF2-40B4-BE49-F238E27FC236}">
+                <a16:creationId xmlns:a16="http://schemas.microsoft.com/office/drawing/2014/main" id="{0A2A4B6B-C796-A3EC-ABA1-5E299C47A8A6}"/>
+              </a:ext>
+            </a:extLst>
+          </p:cNvPr>
+          <p:cNvSpPr>
+            <a:spLocks noGrp="1"/>
+          </p:cNvSpPr>
+          <p:nvPr>
+            <p:ph idx="1"/>
+          </p:nvPr>
+        </p:nvSpPr>
+        <p:spPr>
+          <a:xfrm>
+            <a:off x="1122830" y="2468031"/>
+            <a:ext cx="8825659" cy="3895061"/>
+          </a:xfrm>
+        </p:spPr>
+        <p:txBody>
+          <a:bodyPr>
+            <a:normAutofit/>
+          </a:bodyPr>
+          <a:lstStyle/>
+          <a:p>
+            <a:pPr marL="0" indent="0">
+              <a:buNone/>
+            </a:pPr>
+            <a:r>
+              <a:rPr lang="es-MX" sz="1600" b="1" dirty="0"/>
+              <a:t>DOBLE INTERFAZ DE USUARIO (CONSOLA Y GRÁFICA)</a:t>
+            </a:r>
+          </a:p>
+          <a:p>
+            <a:pPr marL="0" indent="0">
+              <a:buNone/>
+            </a:pPr>
+            <a:r>
+              <a:rPr lang="es-MX" sz="1600" dirty="0"/>
+              <a:t>• ARQUITECTURA DUAL: Misma lógica de negocio, diferentes presentaciones</a:t>
+            </a:r>
+          </a:p>
+          <a:p>
+            <a:pPr marL="0" indent="0">
+              <a:buNone/>
+            </a:pPr>
+            <a:r>
+              <a:rPr lang="es-MX" sz="1600" dirty="0"/>
+              <a:t>• VISTA GRÁFICA: VistaGrafica con Swing y ActionListeners</a:t>
+            </a:r>
+          </a:p>
+          <a:p>
+            <a:pPr marL="0" indent="0">
+              <a:buNone/>
+            </a:pPr>
+            <a:r>
+              <a:rPr lang="es-MX" sz="1600" dirty="0"/>
+              <a:t>• VISTA CONSOLA: ConsolaGrafica con máquina de estados y clases Flujo</a:t>
+            </a:r>
+          </a:p>
+          <a:p>
+            <a:pPr marL="0" indent="0">
+              <a:buNone/>
+            </a:pPr>
+            <a:r>
+              <a:rPr lang="es-MX" sz="1600" dirty="0"/>
+              <a:t>• PATRÓN MVC: Controlador único para ambas interfaces</a:t>
+            </a:r>
+          </a:p>
+          <a:p>
+            <a:pPr marL="0" indent="0">
+              <a:buNone/>
+            </a:pPr>
+            <a:r>
+              <a:rPr lang="es-MX" sz="1600" dirty="0"/>
+              <a:t>• VENTAJA EDUCATIVA: Demuestra separación perfecta entre lógica y presentación</a:t>
+            </a:r>
+          </a:p>
+        </p:txBody>
+      </p:sp>
+    </p:spTree>
+    <p:extLst>
+      <p:ext uri="{BB962C8B-B14F-4D97-AF65-F5344CB8AC3E}">
+        <p14:creationId xmlns:p14="http://schemas.microsoft.com/office/powerpoint/2010/main" val="1013024494"/>
+      </p:ext>
+    </p:extLst>
+  </p:cSld>
+  <p:clrMapOvr>
+    <a:masterClrMapping/>
+  </p:clrMapOvr>
+</p:sld>
+</file>
+
+<file path=ppt/slides/slide48.xml><?xml version="1.0" encoding="utf-8"?>
+<p:sld xmlns:a="http://schemas.openxmlformats.org/drawingml/2006/main" xmlns:r="http://schemas.openxmlformats.org/officeDocument/2006/relationships" xmlns:p="http://schemas.openxmlformats.org/presentationml/2006/main">
+  <p:cSld>
+    <p:spTree>
+      <p:nvGrpSpPr>
+        <p:cNvPr id="1" name="">
+          <a:extLst>
+            <a:ext uri="{FF2B5EF4-FFF2-40B4-BE49-F238E27FC236}">
+              <a16:creationId xmlns:a16="http://schemas.microsoft.com/office/drawing/2014/main" id="{F2918E7E-FF9C-5341-B828-E9356FD8AB16}"/>
+            </a:ext>
+          </a:extLst>
+        </p:cNvPr>
+        <p:cNvGrpSpPr/>
+        <p:nvPr/>
+      </p:nvGrpSpPr>
+      <p:grpSpPr>
+        <a:xfrm>
+          <a:off x="0" y="0"/>
+          <a:ext cx="0" cy="0"/>
+          <a:chOff x="0" y="0"/>
+          <a:chExt cx="0" cy="0"/>
+        </a:xfrm>
+      </p:grpSpPr>
+      <p:sp>
+        <p:nvSpPr>
+          <p:cNvPr id="2" name="Title 1">
+            <a:extLst>
+              <a:ext uri="{FF2B5EF4-FFF2-40B4-BE49-F238E27FC236}">
+                <a16:creationId xmlns:a16="http://schemas.microsoft.com/office/drawing/2014/main" id="{E62F630E-8BB0-6643-2170-DC52A8C3F4D5}"/>
+              </a:ext>
+            </a:extLst>
+          </p:cNvPr>
+          <p:cNvSpPr>
+            <a:spLocks noGrp="1"/>
+          </p:cNvSpPr>
+          <p:nvPr>
+            <p:ph type="title"/>
+          </p:nvPr>
+        </p:nvSpPr>
+        <p:spPr/>
+        <p:txBody>
+          <a:bodyPr/>
+          <a:lstStyle/>
+          <a:p>
+            <a:r>
+              <a:rPr lang="es-AR" dirty="0"/>
+              <a:t>RESUMEN DE FUNCIONALIDADES</a:t>
+            </a:r>
+          </a:p>
+        </p:txBody>
+      </p:sp>
+      <p:sp>
+        <p:nvSpPr>
+          <p:cNvPr id="3" name="Content Placeholder 2">
+            <a:extLst>
+              <a:ext uri="{FF2B5EF4-FFF2-40B4-BE49-F238E27FC236}">
+                <a16:creationId xmlns:a16="http://schemas.microsoft.com/office/drawing/2014/main" id="{3409F371-9236-945A-39D5-667DD5C043F0}"/>
+              </a:ext>
+            </a:extLst>
+          </p:cNvPr>
+          <p:cNvSpPr>
+            <a:spLocks noGrp="1"/>
+          </p:cNvSpPr>
+          <p:nvPr>
+            <p:ph idx="1"/>
+          </p:nvPr>
+        </p:nvSpPr>
+        <p:spPr>
+          <a:xfrm>
+            <a:off x="1122830" y="2468031"/>
+            <a:ext cx="8825659" cy="3895061"/>
+          </a:xfrm>
+        </p:spPr>
+        <p:txBody>
+          <a:bodyPr>
+            <a:normAutofit lnSpcReduction="10000"/>
+          </a:bodyPr>
+          <a:lstStyle/>
+          <a:p>
+            <a:pPr marL="0" indent="0">
+              <a:buNone/>
+            </a:pPr>
+            <a:r>
+              <a:rPr lang="es-MX" sz="1600" b="1" dirty="0"/>
+              <a:t>FUNCIONALIDADES</a:t>
+            </a:r>
+          </a:p>
+          <a:p>
+            <a:pPr marL="0" indent="0">
+              <a:buNone/>
+            </a:pPr>
+            <a:r>
+              <a:rPr lang="es-MX" sz="1600" dirty="0"/>
+              <a:t>• Sistema de turnos con validaciones de estado</a:t>
+            </a:r>
+          </a:p>
+          <a:p>
+            <a:pPr marL="0" indent="0">
+              <a:buNone/>
+            </a:pPr>
+            <a:r>
+              <a:rPr lang="es-MX" sz="1600" dirty="0"/>
+              <a:t>• Cálculo de puntajes con premios especiales del tablero</a:t>
+            </a:r>
+          </a:p>
+          <a:p>
+            <a:pPr marL="0" indent="0">
+              <a:buNone/>
+            </a:pPr>
+            <a:r>
+              <a:rPr lang="es-MX" sz="1600" dirty="0"/>
+              <a:t>• Gestión de fichas con distribución automática y cambio de fichas</a:t>
+            </a:r>
+          </a:p>
+          <a:p>
+            <a:pPr marL="0" indent="0">
+              <a:buNone/>
+            </a:pPr>
+            <a:r>
+              <a:rPr lang="es-MX" sz="1600" dirty="0"/>
+              <a:t>• Ranking persistente con serialización de datos</a:t>
+            </a:r>
+          </a:p>
+          <a:p>
+            <a:pPr marL="0" indent="0">
+              <a:buNone/>
+            </a:pPr>
+            <a:endParaRPr lang="es-MX" sz="1600" b="1" dirty="0"/>
+          </a:p>
+          <a:p>
+            <a:pPr marL="0" indent="0">
+              <a:buNone/>
+            </a:pPr>
+            <a:r>
+              <a:rPr lang="es-MX" sz="1600" b="1" dirty="0"/>
+              <a:t>PATRONES DE DISEÑO</a:t>
+            </a:r>
+          </a:p>
+          <a:p>
+            <a:pPr marL="0" indent="0">
+              <a:buNone/>
+            </a:pPr>
+            <a:r>
+              <a:rPr lang="es-MX" sz="1600" dirty="0"/>
+              <a:t>• MVC estricto con separación de capas</a:t>
+            </a:r>
+          </a:p>
+          <a:p>
+            <a:pPr marL="0" indent="0">
+              <a:buNone/>
+            </a:pPr>
+            <a:r>
+              <a:rPr lang="es-MX" sz="1600" dirty="0"/>
+              <a:t>• Observer/Observable para notificaciones</a:t>
+            </a:r>
+          </a:p>
+          <a:p>
+            <a:pPr marL="0" indent="0">
+              <a:buNone/>
+            </a:pPr>
+            <a:r>
+              <a:rPr lang="es-MX" sz="1600" dirty="0"/>
+              <a:t>• Factory Method para creación de casilleros</a:t>
+            </a:r>
+          </a:p>
+          <a:p>
+            <a:pPr marL="0" indent="0">
+              <a:buNone/>
+            </a:pPr>
+            <a:r>
+              <a:rPr lang="es-MX" sz="1600" dirty="0"/>
+              <a:t>• Strategy implícito en tipos de premio</a:t>
+            </a:r>
+          </a:p>
+        </p:txBody>
+      </p:sp>
+    </p:spTree>
+    <p:extLst>
+      <p:ext uri="{BB962C8B-B14F-4D97-AF65-F5344CB8AC3E}">
+        <p14:creationId xmlns:p14="http://schemas.microsoft.com/office/powerpoint/2010/main" val="2903332826"/>
+      </p:ext>
+    </p:extLst>
+  </p:cSld>
+  <p:clrMapOvr>
+    <a:masterClrMapping/>
+  </p:clrMapOvr>
+</p:sld>
+</file>
+
+<file path=ppt/slides/slide49.xml><?xml version="1.0" encoding="utf-8"?>
+<p:sld xmlns:a="http://schemas.openxmlformats.org/drawingml/2006/main" xmlns:r="http://schemas.openxmlformats.org/officeDocument/2006/relationships" xmlns:p="http://schemas.openxmlformats.org/presentationml/2006/main">
+  <p:cSld>
+    <p:spTree>
+      <p:nvGrpSpPr>
+        <p:cNvPr id="1" name="">
+          <a:extLst>
+            <a:ext uri="{FF2B5EF4-FFF2-40B4-BE49-F238E27FC236}">
+              <a16:creationId xmlns:a16="http://schemas.microsoft.com/office/drawing/2014/main" id="{38FB44C5-3448-167B-F986-13F002698C33}"/>
+            </a:ext>
+          </a:extLst>
+        </p:cNvPr>
+        <p:cNvGrpSpPr/>
+        <p:nvPr/>
+      </p:nvGrpSpPr>
+      <p:grpSpPr>
+        <a:xfrm>
+          <a:off x="0" y="0"/>
+          <a:ext cx="0" cy="0"/>
+          <a:chOff x="0" y="0"/>
+          <a:chExt cx="0" cy="0"/>
+        </a:xfrm>
+      </p:grpSpPr>
+      <p:sp>
+        <p:nvSpPr>
+          <p:cNvPr id="2" name="Title 1">
+            <a:extLst>
+              <a:ext uri="{FF2B5EF4-FFF2-40B4-BE49-F238E27FC236}">
+                <a16:creationId xmlns:a16="http://schemas.microsoft.com/office/drawing/2014/main" id="{68B504D8-8DB3-E225-61BE-28A7A8799F40}"/>
+              </a:ext>
+            </a:extLst>
+          </p:cNvPr>
+          <p:cNvSpPr>
+            <a:spLocks noGrp="1"/>
+          </p:cNvSpPr>
+          <p:nvPr>
+            <p:ph type="ctrTitle"/>
+          </p:nvPr>
+        </p:nvSpPr>
+        <p:spPr/>
+        <p:txBody>
+          <a:bodyPr/>
+          <a:lstStyle/>
+          <a:p>
+            <a:r>
+              <a:rPr lang="es-AR" dirty="0"/>
+              <a:t>RESUMEN DE CARPETAS</a:t>
+            </a:r>
+          </a:p>
+        </p:txBody>
+      </p:sp>
+    </p:spTree>
+    <p:extLst>
+      <p:ext uri="{BB962C8B-B14F-4D97-AF65-F5344CB8AC3E}">
+        <p14:creationId xmlns:p14="http://schemas.microsoft.com/office/powerpoint/2010/main" val="389482404"/>
+      </p:ext>
+    </p:extLst>
+  </p:cSld>
+  <p:clrMapOvr>
+    <a:masterClrMapping/>
+  </p:clrMapOvr>
+</p:sld>
+</file>
+
 <file path=ppt/slides/slide5.xml><?xml version="1.0" encoding="utf-8"?>
 <p:sld xmlns:a="http://schemas.openxmlformats.org/drawingml/2006/main" xmlns:r="http://schemas.openxmlformats.org/officeDocument/2006/relationships" xmlns:p="http://schemas.openxmlformats.org/presentationml/2006/main">
   <p:cSld>
@@ -18112,6 +19941,835 @@
     <p:extLst>
       <p:ext uri="{BB962C8B-B14F-4D97-AF65-F5344CB8AC3E}">
         <p14:creationId xmlns:p14="http://schemas.microsoft.com/office/powerpoint/2010/main" val="1080355585"/>
+      </p:ext>
+    </p:extLst>
+  </p:cSld>
+  <p:clrMapOvr>
+    <a:masterClrMapping/>
+  </p:clrMapOvr>
+</p:sld>
+</file>
+
+<file path=ppt/slides/slide50.xml><?xml version="1.0" encoding="utf-8"?>
+<p:sld xmlns:a="http://schemas.openxmlformats.org/drawingml/2006/main" xmlns:r="http://schemas.openxmlformats.org/officeDocument/2006/relationships" xmlns:p="http://schemas.openxmlformats.org/presentationml/2006/main">
+  <p:cSld>
+    <p:spTree>
+      <p:nvGrpSpPr>
+        <p:cNvPr id="1" name="">
+          <a:extLst>
+            <a:ext uri="{FF2B5EF4-FFF2-40B4-BE49-F238E27FC236}">
+              <a16:creationId xmlns:a16="http://schemas.microsoft.com/office/drawing/2014/main" id="{51B0495D-8642-6A0B-DA38-6A770AAB8184}"/>
+            </a:ext>
+          </a:extLst>
+        </p:cNvPr>
+        <p:cNvGrpSpPr/>
+        <p:nvPr/>
+      </p:nvGrpSpPr>
+      <p:grpSpPr>
+        <a:xfrm>
+          <a:off x="0" y="0"/>
+          <a:ext cx="0" cy="0"/>
+          <a:chOff x="0" y="0"/>
+          <a:chExt cx="0" cy="0"/>
+        </a:xfrm>
+      </p:grpSpPr>
+      <p:sp>
+        <p:nvSpPr>
+          <p:cNvPr id="2" name="Title 1">
+            <a:extLst>
+              <a:ext uri="{FF2B5EF4-FFF2-40B4-BE49-F238E27FC236}">
+                <a16:creationId xmlns:a16="http://schemas.microsoft.com/office/drawing/2014/main" id="{ED88B597-0EE1-1913-CDA7-D2690AB77DE7}"/>
+              </a:ext>
+            </a:extLst>
+          </p:cNvPr>
+          <p:cNvSpPr>
+            <a:spLocks noGrp="1"/>
+          </p:cNvSpPr>
+          <p:nvPr>
+            <p:ph type="title"/>
+          </p:nvPr>
+        </p:nvSpPr>
+        <p:spPr/>
+        <p:txBody>
+          <a:bodyPr/>
+          <a:lstStyle/>
+          <a:p>
+            <a:r>
+              <a:rPr lang="es-AR" dirty="0"/>
+              <a:t>CARPETAS</a:t>
+            </a:r>
+          </a:p>
+        </p:txBody>
+      </p:sp>
+      <p:sp>
+        <p:nvSpPr>
+          <p:cNvPr id="3" name="Content Placeholder 2">
+            <a:extLst>
+              <a:ext uri="{FF2B5EF4-FFF2-40B4-BE49-F238E27FC236}">
+                <a16:creationId xmlns:a16="http://schemas.microsoft.com/office/drawing/2014/main" id="{32CD1C6F-7163-FBA6-C477-B4FE15C33CB7}"/>
+              </a:ext>
+            </a:extLst>
+          </p:cNvPr>
+          <p:cNvSpPr>
+            <a:spLocks noGrp="1"/>
+          </p:cNvSpPr>
+          <p:nvPr>
+            <p:ph idx="1"/>
+          </p:nvPr>
+        </p:nvSpPr>
+        <p:spPr>
+          <a:xfrm>
+            <a:off x="1122830" y="2468031"/>
+            <a:ext cx="8825659" cy="3895061"/>
+          </a:xfrm>
+        </p:spPr>
+        <p:txBody>
+          <a:bodyPr>
+            <a:normAutofit lnSpcReduction="10000"/>
+          </a:bodyPr>
+          <a:lstStyle/>
+          <a:p>
+            <a:pPr marL="0" indent="0">
+              <a:buNone/>
+            </a:pPr>
+            <a:r>
+              <a:rPr lang="es-MX" sz="1600" b="1" dirty="0"/>
+              <a:t>RESUMEN DE CARPETAS</a:t>
+            </a:r>
+          </a:p>
+          <a:p>
+            <a:pPr marL="0" indent="0">
+              <a:buNone/>
+            </a:pPr>
+            <a:r>
+              <a:rPr lang="es-MX" sz="1600" dirty="0"/>
+              <a:t>1. SISTEMA DE TURNOS</a:t>
+            </a:r>
+          </a:p>
+          <a:p>
+            <a:pPr marL="0" indent="0">
+              <a:buNone/>
+            </a:pPr>
+            <a:r>
+              <a:rPr lang="es-MX" sz="1600" dirty="0"/>
+              <a:t>	ModeloJuego.java (siguienteTurno)</a:t>
+            </a:r>
+          </a:p>
+          <a:p>
+            <a:pPr marL="0" indent="0">
+              <a:buNone/>
+            </a:pPr>
+            <a:r>
+              <a:rPr lang="es-MX" sz="1600" dirty="0"/>
+              <a:t>2. TABLERO BIDIMENSIONAL</a:t>
+            </a:r>
+          </a:p>
+          <a:p>
+            <a:pPr marL="0" indent="0">
+              <a:buNone/>
+            </a:pPr>
+            <a:r>
+              <a:rPr lang="es-MX" sz="1600" dirty="0"/>
+              <a:t>	Tablero.java, Casillero.java, PremioLetra.java, PremioPalabra.java</a:t>
+            </a:r>
+          </a:p>
+          <a:p>
+            <a:pPr marL="0" indent="0">
+              <a:buNone/>
+            </a:pPr>
+            <a:r>
+              <a:rPr lang="es-MX" sz="1600" dirty="0"/>
+              <a:t>3. GESTIÓN DE FICHAS CON BOLSA VIRTUAL</a:t>
+            </a:r>
+          </a:p>
+          <a:p>
+            <a:pPr marL="0" indent="0">
+              <a:buNone/>
+            </a:pPr>
+            <a:r>
+              <a:rPr lang="es-MX" sz="1600" dirty="0"/>
+              <a:t>	BolsaFichas.java, Jugador.java</a:t>
+            </a:r>
+          </a:p>
+          <a:p>
+            <a:pPr marL="0" indent="0">
+              <a:buNone/>
+            </a:pPr>
+            <a:r>
+              <a:rPr lang="es-MX" sz="1600" dirty="0"/>
+              <a:t>4. SISTEMA DE DICCIONARIO</a:t>
+            </a:r>
+          </a:p>
+          <a:p>
+            <a:pPr marL="0" indent="0">
+              <a:buNone/>
+            </a:pPr>
+            <a:r>
+              <a:rPr lang="es-MX" sz="1600" dirty="0"/>
+              <a:t>	Diccionario.java, DiccionarioFactory.java, /diccionario/*.</a:t>
+            </a:r>
+            <a:r>
+              <a:rPr lang="es-MX" sz="1600" dirty="0" err="1"/>
+              <a:t>txt</a:t>
+            </a:r>
+            <a:endParaRPr lang="es-MX" sz="1600" dirty="0"/>
+          </a:p>
+          <a:p>
+            <a:pPr marL="0" indent="0">
+              <a:buNone/>
+            </a:pPr>
+            <a:r>
+              <a:rPr lang="es-MX" sz="1600" dirty="0"/>
+              <a:t>5. SISTEMA DE PUNTAJES CON TABLA ESPECIALIZADA</a:t>
+            </a:r>
+          </a:p>
+          <a:p>
+            <a:pPr marL="0" indent="0">
+              <a:buNone/>
+            </a:pPr>
+            <a:r>
+              <a:rPr lang="es-MX" sz="1600" dirty="0"/>
+              <a:t>	PuntajeFichas.java</a:t>
+            </a:r>
+          </a:p>
+        </p:txBody>
+      </p:sp>
+    </p:spTree>
+    <p:extLst>
+      <p:ext uri="{BB962C8B-B14F-4D97-AF65-F5344CB8AC3E}">
+        <p14:creationId xmlns:p14="http://schemas.microsoft.com/office/powerpoint/2010/main" val="2676695089"/>
+      </p:ext>
+    </p:extLst>
+  </p:cSld>
+  <p:clrMapOvr>
+    <a:masterClrMapping/>
+  </p:clrMapOvr>
+</p:sld>
+</file>
+
+<file path=ppt/slides/slide51.xml><?xml version="1.0" encoding="utf-8"?>
+<p:sld xmlns:a="http://schemas.openxmlformats.org/drawingml/2006/main" xmlns:r="http://schemas.openxmlformats.org/officeDocument/2006/relationships" xmlns:p="http://schemas.openxmlformats.org/presentationml/2006/main">
+  <p:cSld>
+    <p:spTree>
+      <p:nvGrpSpPr>
+        <p:cNvPr id="1" name="">
+          <a:extLst>
+            <a:ext uri="{FF2B5EF4-FFF2-40B4-BE49-F238E27FC236}">
+              <a16:creationId xmlns:a16="http://schemas.microsoft.com/office/drawing/2014/main" id="{35E219C4-EC26-AD01-B20A-F2CFBED3C1BC}"/>
+            </a:ext>
+          </a:extLst>
+        </p:cNvPr>
+        <p:cNvGrpSpPr/>
+        <p:nvPr/>
+      </p:nvGrpSpPr>
+      <p:grpSpPr>
+        <a:xfrm>
+          <a:off x="0" y="0"/>
+          <a:ext cx="0" cy="0"/>
+          <a:chOff x="0" y="0"/>
+          <a:chExt cx="0" cy="0"/>
+        </a:xfrm>
+      </p:grpSpPr>
+      <p:sp>
+        <p:nvSpPr>
+          <p:cNvPr id="2" name="Title 1">
+            <a:extLst>
+              <a:ext uri="{FF2B5EF4-FFF2-40B4-BE49-F238E27FC236}">
+                <a16:creationId xmlns:a16="http://schemas.microsoft.com/office/drawing/2014/main" id="{9DF820B6-3040-2ACF-7407-691D2DD6B023}"/>
+              </a:ext>
+            </a:extLst>
+          </p:cNvPr>
+          <p:cNvSpPr>
+            <a:spLocks noGrp="1"/>
+          </p:cNvSpPr>
+          <p:nvPr>
+            <p:ph type="title"/>
+          </p:nvPr>
+        </p:nvSpPr>
+        <p:spPr/>
+        <p:txBody>
+          <a:bodyPr/>
+          <a:lstStyle/>
+          <a:p>
+            <a:r>
+              <a:rPr lang="es-AR" dirty="0"/>
+              <a:t>CARPETAS</a:t>
+            </a:r>
+          </a:p>
+        </p:txBody>
+      </p:sp>
+      <p:sp>
+        <p:nvSpPr>
+          <p:cNvPr id="3" name="Content Placeholder 2">
+            <a:extLst>
+              <a:ext uri="{FF2B5EF4-FFF2-40B4-BE49-F238E27FC236}">
+                <a16:creationId xmlns:a16="http://schemas.microsoft.com/office/drawing/2014/main" id="{2AF794D7-6630-D82B-1FD2-77ABC412C3F2}"/>
+              </a:ext>
+            </a:extLst>
+          </p:cNvPr>
+          <p:cNvSpPr>
+            <a:spLocks noGrp="1"/>
+          </p:cNvSpPr>
+          <p:nvPr>
+            <p:ph idx="1"/>
+          </p:nvPr>
+        </p:nvSpPr>
+        <p:spPr>
+          <a:xfrm>
+            <a:off x="1122830" y="2468031"/>
+            <a:ext cx="8825659" cy="3895061"/>
+          </a:xfrm>
+        </p:spPr>
+        <p:txBody>
+          <a:bodyPr>
+            <a:normAutofit lnSpcReduction="10000"/>
+          </a:bodyPr>
+          <a:lstStyle/>
+          <a:p>
+            <a:pPr marL="0" indent="0">
+              <a:buNone/>
+            </a:pPr>
+            <a:r>
+              <a:rPr lang="es-MX" sz="1600" b="1" dirty="0"/>
+              <a:t>RESUMEN DE CARPETAS</a:t>
+            </a:r>
+          </a:p>
+          <a:p>
+            <a:pPr marL="0" indent="0">
+              <a:buNone/>
+            </a:pPr>
+            <a:r>
+              <a:rPr lang="es-MX" sz="1600" dirty="0"/>
+              <a:t>6.  FICHAS CON IDENTIDAD ÚNICA</a:t>
+            </a:r>
+          </a:p>
+          <a:p>
+            <a:pPr marL="0" indent="0">
+              <a:buNone/>
+            </a:pPr>
+            <a:r>
+              <a:rPr lang="es-MX" sz="1600" dirty="0"/>
+              <a:t>	</a:t>
+            </a:r>
+            <a:r>
+              <a:rPr lang="pt-BR" sz="1600" dirty="0"/>
+              <a:t>Letra.java (ID único + contador)</a:t>
+            </a:r>
+            <a:endParaRPr lang="es-MX" sz="1600" dirty="0"/>
+          </a:p>
+          <a:p>
+            <a:pPr marL="0" indent="0">
+              <a:buNone/>
+            </a:pPr>
+            <a:r>
+              <a:rPr lang="es-MX" sz="1600" dirty="0"/>
+              <a:t>7. VALIDACIÓN MULTICAPA DE PALABRAS</a:t>
+            </a:r>
+          </a:p>
+          <a:p>
+            <a:pPr marL="0" indent="0">
+              <a:buNone/>
+            </a:pPr>
+            <a:r>
+              <a:rPr lang="es-MX" sz="1600" dirty="0"/>
+              <a:t>	Tablero.java (validarPalabra), Diccionario.java</a:t>
+            </a:r>
+          </a:p>
+          <a:p>
+            <a:pPr marL="0" indent="0">
+              <a:buNone/>
+            </a:pPr>
+            <a:r>
+              <a:rPr lang="es-MX" sz="1600" dirty="0"/>
+              <a:t>8. SISTEMA DE PUNTAJES DINÁMICO CON MULTIPLICADORES</a:t>
+            </a:r>
+          </a:p>
+          <a:p>
+            <a:pPr marL="0" indent="0">
+              <a:buNone/>
+            </a:pPr>
+            <a:r>
+              <a:rPr lang="es-MX" sz="1600" dirty="0"/>
+              <a:t>	Tablero.java (calcularPuntos), PremioLetra.java, PremioPalabra.java</a:t>
+            </a:r>
+          </a:p>
+          <a:p>
+            <a:pPr marL="0" indent="0">
+              <a:buNone/>
+            </a:pPr>
+            <a:r>
+              <a:rPr lang="es-MX" sz="1600" dirty="0"/>
+              <a:t>9. ARQUITECTURA CLIENTE-SERVIDOR DISTRIBUIDA</a:t>
+            </a:r>
+          </a:p>
+          <a:p>
+            <a:pPr marL="0" indent="0">
+              <a:buNone/>
+            </a:pPr>
+            <a:r>
+              <a:rPr lang="es-MX" sz="1600" dirty="0"/>
+              <a:t>	</a:t>
+            </a:r>
+            <a:r>
+              <a:rPr lang="pt-BR" sz="1600" dirty="0"/>
+              <a:t>/servidor/AppServidor.java, /cliente/AppClienteVistaGrafica.java</a:t>
+            </a:r>
+          </a:p>
+          <a:p>
+            <a:pPr marL="0" indent="0">
+              <a:buNone/>
+            </a:pPr>
+            <a:r>
+              <a:rPr lang="pt-BR" sz="1600" dirty="0"/>
+              <a:t>10. CONFIGURACIÓN CENTRALIZADA DEL JUEGO</a:t>
+            </a:r>
+          </a:p>
+          <a:p>
+            <a:pPr marL="0" indent="0">
+              <a:buNone/>
+            </a:pPr>
+            <a:r>
+              <a:rPr lang="pt-BR" sz="1600" dirty="0"/>
+              <a:t>	ConfiguracionJuego.java</a:t>
+            </a:r>
+            <a:endParaRPr lang="es-MX" sz="1600" dirty="0"/>
+          </a:p>
+        </p:txBody>
+      </p:sp>
+    </p:spTree>
+    <p:extLst>
+      <p:ext uri="{BB962C8B-B14F-4D97-AF65-F5344CB8AC3E}">
+        <p14:creationId xmlns:p14="http://schemas.microsoft.com/office/powerpoint/2010/main" val="492381632"/>
+      </p:ext>
+    </p:extLst>
+  </p:cSld>
+  <p:clrMapOvr>
+    <a:masterClrMapping/>
+  </p:clrMapOvr>
+</p:sld>
+</file>
+
+<file path=ppt/slides/slide52.xml><?xml version="1.0" encoding="utf-8"?>
+<p:sld xmlns:a="http://schemas.openxmlformats.org/drawingml/2006/main" xmlns:r="http://schemas.openxmlformats.org/officeDocument/2006/relationships" xmlns:p="http://schemas.openxmlformats.org/presentationml/2006/main">
+  <p:cSld>
+    <p:spTree>
+      <p:nvGrpSpPr>
+        <p:cNvPr id="1" name="">
+          <a:extLst>
+            <a:ext uri="{FF2B5EF4-FFF2-40B4-BE49-F238E27FC236}">
+              <a16:creationId xmlns:a16="http://schemas.microsoft.com/office/drawing/2014/main" id="{D0FF55DC-FFA0-0D7A-3548-B111D16D61A1}"/>
+            </a:ext>
+          </a:extLst>
+        </p:cNvPr>
+        <p:cNvGrpSpPr/>
+        <p:nvPr/>
+      </p:nvGrpSpPr>
+      <p:grpSpPr>
+        <a:xfrm>
+          <a:off x="0" y="0"/>
+          <a:ext cx="0" cy="0"/>
+          <a:chOff x="0" y="0"/>
+          <a:chExt cx="0" cy="0"/>
+        </a:xfrm>
+      </p:grpSpPr>
+      <p:sp>
+        <p:nvSpPr>
+          <p:cNvPr id="2" name="Title 1">
+            <a:extLst>
+              <a:ext uri="{FF2B5EF4-FFF2-40B4-BE49-F238E27FC236}">
+                <a16:creationId xmlns:a16="http://schemas.microsoft.com/office/drawing/2014/main" id="{1799E193-9894-CEEA-1086-6696BDE78870}"/>
+              </a:ext>
+            </a:extLst>
+          </p:cNvPr>
+          <p:cNvSpPr>
+            <a:spLocks noGrp="1"/>
+          </p:cNvSpPr>
+          <p:nvPr>
+            <p:ph type="title"/>
+          </p:nvPr>
+        </p:nvSpPr>
+        <p:spPr/>
+        <p:txBody>
+          <a:bodyPr/>
+          <a:lstStyle/>
+          <a:p>
+            <a:r>
+              <a:rPr lang="es-AR" dirty="0"/>
+              <a:t>CARPETAS</a:t>
+            </a:r>
+          </a:p>
+        </p:txBody>
+      </p:sp>
+      <p:sp>
+        <p:nvSpPr>
+          <p:cNvPr id="3" name="Content Placeholder 2">
+            <a:extLst>
+              <a:ext uri="{FF2B5EF4-FFF2-40B4-BE49-F238E27FC236}">
+                <a16:creationId xmlns:a16="http://schemas.microsoft.com/office/drawing/2014/main" id="{1B109CD2-7A0B-6DEF-1B7A-F0B9A2982703}"/>
+              </a:ext>
+            </a:extLst>
+          </p:cNvPr>
+          <p:cNvSpPr>
+            <a:spLocks noGrp="1"/>
+          </p:cNvSpPr>
+          <p:nvPr>
+            <p:ph idx="1"/>
+          </p:nvPr>
+        </p:nvSpPr>
+        <p:spPr>
+          <a:xfrm>
+            <a:off x="1122830" y="2468031"/>
+            <a:ext cx="8825659" cy="3895061"/>
+          </a:xfrm>
+        </p:spPr>
+        <p:txBody>
+          <a:bodyPr>
+            <a:normAutofit lnSpcReduction="10000"/>
+          </a:bodyPr>
+          <a:lstStyle/>
+          <a:p>
+            <a:pPr marL="0" indent="0">
+              <a:buNone/>
+            </a:pPr>
+            <a:r>
+              <a:rPr lang="es-MX" sz="1600" b="1" dirty="0"/>
+              <a:t>RESUMEN DE CARPETAS</a:t>
+            </a:r>
+          </a:p>
+          <a:p>
+            <a:pPr marL="0" indent="0">
+              <a:buNone/>
+            </a:pPr>
+            <a:r>
+              <a:rPr lang="es-MX" sz="1600" dirty="0"/>
+              <a:t>11. RANKING PERSISTENTE</a:t>
+            </a:r>
+          </a:p>
+          <a:p>
+            <a:pPr marL="0" indent="0">
+              <a:buNone/>
+            </a:pPr>
+            <a:r>
+              <a:rPr lang="es-MX" sz="1600" dirty="0"/>
+              <a:t>	Ranking.java, RankingJugadores.dat</a:t>
+            </a:r>
+          </a:p>
+          <a:p>
+            <a:pPr marL="0" indent="0">
+              <a:buNone/>
+            </a:pPr>
+            <a:r>
+              <a:rPr lang="es-MX" sz="1600" dirty="0"/>
+              <a:t>12. CONTROL DE FIN DE JUEGO MULTICONDICIÓN</a:t>
+            </a:r>
+          </a:p>
+          <a:p>
+            <a:pPr marL="0" indent="0">
+              <a:buNone/>
+            </a:pPr>
+            <a:r>
+              <a:rPr lang="es-MX" sz="1600" dirty="0"/>
+              <a:t>	ModeloJuego.java (evaluarFinJuego, finalizarPartida)</a:t>
+            </a:r>
+          </a:p>
+          <a:p>
+            <a:pPr marL="0" indent="0">
+              <a:buNone/>
+            </a:pPr>
+            <a:r>
+              <a:rPr lang="es-MX" sz="1600" dirty="0"/>
+              <a:t>13. PATRÓN STRATEGY PARA CASILLEROS</a:t>
+            </a:r>
+          </a:p>
+          <a:p>
+            <a:pPr marL="0" indent="0">
+              <a:buNone/>
+            </a:pPr>
+            <a:r>
+              <a:rPr lang="es-MX" sz="1600" dirty="0"/>
+              <a:t>	Casillero.java (interfaz), CasilleroVacio.java, PremioLetra.java</a:t>
+            </a:r>
+          </a:p>
+          <a:p>
+            <a:pPr marL="0" indent="0">
+              <a:buNone/>
+            </a:pPr>
+            <a:r>
+              <a:rPr lang="es-MX" sz="1600" dirty="0"/>
+              <a:t>14. VALIDACIÓN DE ENTRADA</a:t>
+            </a:r>
+          </a:p>
+          <a:p>
+            <a:pPr marL="0" indent="0">
+              <a:buNone/>
+            </a:pPr>
+            <a:r>
+              <a:rPr lang="es-MX" sz="1600" dirty="0"/>
+              <a:t>	AppClienteVistaGrafica.java (métodos validación)</a:t>
+            </a:r>
+          </a:p>
+          <a:p>
+            <a:pPr marL="0" indent="0">
+              <a:buNone/>
+            </a:pPr>
+            <a:r>
+              <a:rPr lang="es-MX" sz="1600" dirty="0"/>
+              <a:t>15. INTERFAZ GRÁFICA RESPONSIVA</a:t>
+            </a:r>
+          </a:p>
+          <a:p>
+            <a:pPr marL="0" indent="0">
+              <a:buNone/>
+            </a:pPr>
+            <a:r>
+              <a:rPr lang="es-MX" sz="1600" dirty="0"/>
+              <a:t>	VistaGrafica.java, VentanaTablero.java, JTableAtril.java</a:t>
+            </a:r>
+          </a:p>
+        </p:txBody>
+      </p:sp>
+    </p:spTree>
+    <p:extLst>
+      <p:ext uri="{BB962C8B-B14F-4D97-AF65-F5344CB8AC3E}">
+        <p14:creationId xmlns:p14="http://schemas.microsoft.com/office/powerpoint/2010/main" val="2537692037"/>
+      </p:ext>
+    </p:extLst>
+  </p:cSld>
+  <p:clrMapOvr>
+    <a:masterClrMapping/>
+  </p:clrMapOvr>
+</p:sld>
+</file>
+
+<file path=ppt/slides/slide53.xml><?xml version="1.0" encoding="utf-8"?>
+<p:sld xmlns:a="http://schemas.openxmlformats.org/drawingml/2006/main" xmlns:r="http://schemas.openxmlformats.org/officeDocument/2006/relationships" xmlns:p="http://schemas.openxmlformats.org/presentationml/2006/main">
+  <p:cSld>
+    <p:spTree>
+      <p:nvGrpSpPr>
+        <p:cNvPr id="1" name="">
+          <a:extLst>
+            <a:ext uri="{FF2B5EF4-FFF2-40B4-BE49-F238E27FC236}">
+              <a16:creationId xmlns:a16="http://schemas.microsoft.com/office/drawing/2014/main" id="{81E9F18F-2C41-F83B-0923-4E7122736B7C}"/>
+            </a:ext>
+          </a:extLst>
+        </p:cNvPr>
+        <p:cNvGrpSpPr/>
+        <p:nvPr/>
+      </p:nvGrpSpPr>
+      <p:grpSpPr>
+        <a:xfrm>
+          <a:off x="0" y="0"/>
+          <a:ext cx="0" cy="0"/>
+          <a:chOff x="0" y="0"/>
+          <a:chExt cx="0" cy="0"/>
+        </a:xfrm>
+      </p:grpSpPr>
+      <p:sp>
+        <p:nvSpPr>
+          <p:cNvPr id="2" name="Title 1">
+            <a:extLst>
+              <a:ext uri="{FF2B5EF4-FFF2-40B4-BE49-F238E27FC236}">
+                <a16:creationId xmlns:a16="http://schemas.microsoft.com/office/drawing/2014/main" id="{55B3790A-AE2F-40B7-9727-F4F4498EB8AD}"/>
+              </a:ext>
+            </a:extLst>
+          </p:cNvPr>
+          <p:cNvSpPr>
+            <a:spLocks noGrp="1"/>
+          </p:cNvSpPr>
+          <p:nvPr>
+            <p:ph type="title"/>
+          </p:nvPr>
+        </p:nvSpPr>
+        <p:spPr/>
+        <p:txBody>
+          <a:bodyPr/>
+          <a:lstStyle/>
+          <a:p>
+            <a:r>
+              <a:rPr lang="es-AR" dirty="0"/>
+              <a:t>CARPETAS</a:t>
+            </a:r>
+          </a:p>
+        </p:txBody>
+      </p:sp>
+      <p:sp>
+        <p:nvSpPr>
+          <p:cNvPr id="3" name="Content Placeholder 2">
+            <a:extLst>
+              <a:ext uri="{FF2B5EF4-FFF2-40B4-BE49-F238E27FC236}">
+                <a16:creationId xmlns:a16="http://schemas.microsoft.com/office/drawing/2014/main" id="{5B4873FD-784C-B677-1413-65358D225442}"/>
+              </a:ext>
+            </a:extLst>
+          </p:cNvPr>
+          <p:cNvSpPr>
+            <a:spLocks noGrp="1"/>
+          </p:cNvSpPr>
+          <p:nvPr>
+            <p:ph idx="1"/>
+          </p:nvPr>
+        </p:nvSpPr>
+        <p:spPr>
+          <a:xfrm>
+            <a:off x="1122830" y="2468031"/>
+            <a:ext cx="8825659" cy="3895061"/>
+          </a:xfrm>
+        </p:spPr>
+        <p:txBody>
+          <a:bodyPr>
+            <a:normAutofit/>
+          </a:bodyPr>
+          <a:lstStyle/>
+          <a:p>
+            <a:pPr marL="0" indent="0">
+              <a:buNone/>
+            </a:pPr>
+            <a:r>
+              <a:rPr lang="es-MX" sz="1600" b="1" dirty="0"/>
+              <a:t>RESUMEN DE CARPETAS</a:t>
+            </a:r>
+          </a:p>
+          <a:p>
+            <a:pPr marL="0" indent="0">
+              <a:buNone/>
+            </a:pPr>
+            <a:r>
+              <a:rPr lang="es-MX" sz="1600" dirty="0"/>
+              <a:t>16. PERSISTENCIA EFICIENTE</a:t>
+            </a:r>
+          </a:p>
+          <a:p>
+            <a:pPr marL="0" indent="0">
+              <a:buNone/>
+            </a:pPr>
+            <a:r>
+              <a:rPr lang="es-MX" sz="1600" dirty="0"/>
+              <a:t>	Ranking.java (serialización)</a:t>
+            </a:r>
+          </a:p>
+          <a:p>
+            <a:pPr marL="0" indent="0">
+              <a:buNone/>
+            </a:pPr>
+            <a:r>
+              <a:rPr lang="es-MX" sz="1600" dirty="0"/>
+              <a:t>17. DOBLE INTERFAZ (CONSOLA Y GRÁFICA)</a:t>
+            </a:r>
+          </a:p>
+          <a:p>
+            <a:pPr marL="0" indent="0">
+              <a:buNone/>
+            </a:pPr>
+            <a:r>
+              <a:rPr lang="es-MX" sz="1600" dirty="0"/>
+              <a:t>	VistaGrafica.java vs ConsolaGrafica.java, /consolagrafica/</a:t>
+            </a:r>
+          </a:p>
+          <a:p>
+            <a:pPr marL="0" indent="0">
+              <a:buNone/>
+            </a:pPr>
+            <a:r>
+              <a:rPr lang="es-MX" sz="1600" dirty="0"/>
+              <a:t>18. INTERCAMBIO DE FICHAS DURANTE PARTIDA</a:t>
+            </a:r>
+          </a:p>
+          <a:p>
+            <a:pPr marL="0" indent="0">
+              <a:buNone/>
+            </a:pPr>
+            <a:r>
+              <a:rPr lang="es-MX" sz="1600" dirty="0"/>
+              <a:t>	Tablero.java (cambiarFichas), BolsaFichas.java</a:t>
+            </a:r>
+          </a:p>
+          <a:p>
+            <a:pPr marL="0" indent="0">
+              <a:buNone/>
+            </a:pPr>
+            <a:r>
+              <a:rPr lang="es-MX" sz="1600" dirty="0"/>
+              <a:t>19. CÁLCULO AUTOMÁTICO DE PUNTAJES EN PALABRAS</a:t>
+            </a:r>
+          </a:p>
+          <a:p>
+            <a:pPr marL="0" indent="0">
+              <a:buNone/>
+            </a:pPr>
+            <a:r>
+              <a:rPr lang="es-MX" sz="1600" dirty="0"/>
+              <a:t>	Palabra.java (calcularPuntaje)</a:t>
+            </a:r>
+          </a:p>
+        </p:txBody>
+      </p:sp>
+    </p:spTree>
+    <p:extLst>
+      <p:ext uri="{BB962C8B-B14F-4D97-AF65-F5344CB8AC3E}">
+        <p14:creationId xmlns:p14="http://schemas.microsoft.com/office/powerpoint/2010/main" val="3933434746"/>
+      </p:ext>
+    </p:extLst>
+  </p:cSld>
+  <p:clrMapOvr>
+    <a:masterClrMapping/>
+  </p:clrMapOvr>
+</p:sld>
+</file>
+
+<file path=ppt/slides/slide54.xml><?xml version="1.0" encoding="utf-8"?>
+<p:sld xmlns:a="http://schemas.openxmlformats.org/drawingml/2006/main" xmlns:r="http://schemas.openxmlformats.org/officeDocument/2006/relationships" xmlns:p="http://schemas.openxmlformats.org/presentationml/2006/main">
+  <p:cSld>
+    <p:spTree>
+      <p:nvGrpSpPr>
+        <p:cNvPr id="1" name="">
+          <a:extLst>
+            <a:ext uri="{FF2B5EF4-FFF2-40B4-BE49-F238E27FC236}">
+              <a16:creationId xmlns:a16="http://schemas.microsoft.com/office/drawing/2014/main" id="{5E7623B3-12FD-030C-ABA7-9D1DDA7239BE}"/>
+            </a:ext>
+          </a:extLst>
+        </p:cNvPr>
+        <p:cNvGrpSpPr/>
+        <p:nvPr/>
+      </p:nvGrpSpPr>
+      <p:grpSpPr>
+        <a:xfrm>
+          <a:off x="0" y="0"/>
+          <a:ext cx="0" cy="0"/>
+          <a:chOff x="0" y="0"/>
+          <a:chExt cx="0" cy="0"/>
+        </a:xfrm>
+      </p:grpSpPr>
+      <p:sp>
+        <p:nvSpPr>
+          <p:cNvPr id="2" name="Title 1">
+            <a:extLst>
+              <a:ext uri="{FF2B5EF4-FFF2-40B4-BE49-F238E27FC236}">
+                <a16:creationId xmlns:a16="http://schemas.microsoft.com/office/drawing/2014/main" id="{7266B12B-56A4-A1C5-11AC-9CA259ED0753}"/>
+              </a:ext>
+            </a:extLst>
+          </p:cNvPr>
+          <p:cNvSpPr>
+            <a:spLocks noGrp="1"/>
+          </p:cNvSpPr>
+          <p:nvPr>
+            <p:ph type="ctrTitle"/>
+          </p:nvPr>
+        </p:nvSpPr>
+        <p:spPr/>
+        <p:txBody>
+          <a:bodyPr/>
+          <a:lstStyle/>
+          <a:p>
+            <a:r>
+              <a:rPr lang="es-AR" dirty="0"/>
+              <a:t>FIN DE LA PRESENTACIÓN</a:t>
+            </a:r>
+          </a:p>
+        </p:txBody>
+      </p:sp>
+    </p:spTree>
+    <p:extLst>
+      <p:ext uri="{BB962C8B-B14F-4D97-AF65-F5344CB8AC3E}">
+        <p14:creationId xmlns:p14="http://schemas.microsoft.com/office/powerpoint/2010/main" val="680458102"/>
       </p:ext>
     </p:extLst>
   </p:cSld>

</xml_diff>